<commit_message>
draft: API GW / Service Discovery Ready
</commit_message>
<xml_diff>
--- a/wp-content/uploads/2017/05/slides.pptx
+++ b/wp-content/uploads/2017/05/slides.pptx
@@ -6,6 +6,7 @@
   </p:sldMasterIdLst>
   <p:sldIdLst>
     <p:sldId id="256" r:id="rId2"/>
+    <p:sldId id="257" r:id="rId3"/>
   </p:sldIdLst>
   <p:sldSz cx="12192000" cy="6858000"/>
   <p:notesSz cx="6858000" cy="9144000"/>
@@ -104,6 +105,11 @@
       </a:defRPr>
     </a:lvl9pPr>
   </p:defaultTextStyle>
+  <p:extLst>
+    <p:ext uri="{EFAFB233-063F-42B5-8137-9DF3F51BA10A}">
+      <p15:sldGuideLst xmlns:p15="http://schemas.microsoft.com/office/powerpoint/2012/main"/>
+    </p:ext>
+  </p:extLst>
 </p:presentation>
 </file>
 
@@ -238,7 +244,7 @@
           <a:p>
             <a:fld id="{AB2CABD1-DD9B-46C9-AF9D-45F2D6A20CB2}" type="datetimeFigureOut">
               <a:rPr lang="zh-TW" altLang="en-US" smtClean="0"/>
-              <a:t>2017/5/23</a:t>
+              <a:t>2017/6/20</a:t>
             </a:fld>
             <a:endParaRPr lang="zh-TW" altLang="en-US"/>
           </a:p>
@@ -408,7 +414,7 @@
           <a:p>
             <a:fld id="{AB2CABD1-DD9B-46C9-AF9D-45F2D6A20CB2}" type="datetimeFigureOut">
               <a:rPr lang="zh-TW" altLang="en-US" smtClean="0"/>
-              <a:t>2017/5/23</a:t>
+              <a:t>2017/6/20</a:t>
             </a:fld>
             <a:endParaRPr lang="zh-TW" altLang="en-US"/>
           </a:p>
@@ -588,7 +594,7 @@
           <a:p>
             <a:fld id="{AB2CABD1-DD9B-46C9-AF9D-45F2D6A20CB2}" type="datetimeFigureOut">
               <a:rPr lang="zh-TW" altLang="en-US" smtClean="0"/>
-              <a:t>2017/5/23</a:t>
+              <a:t>2017/6/20</a:t>
             </a:fld>
             <a:endParaRPr lang="zh-TW" altLang="en-US"/>
           </a:p>
@@ -758,7 +764,7 @@
           <a:p>
             <a:fld id="{AB2CABD1-DD9B-46C9-AF9D-45F2D6A20CB2}" type="datetimeFigureOut">
               <a:rPr lang="zh-TW" altLang="en-US" smtClean="0"/>
-              <a:t>2017/5/23</a:t>
+              <a:t>2017/6/20</a:t>
             </a:fld>
             <a:endParaRPr lang="zh-TW" altLang="en-US"/>
           </a:p>
@@ -1004,7 +1010,7 @@
           <a:p>
             <a:fld id="{AB2CABD1-DD9B-46C9-AF9D-45F2D6A20CB2}" type="datetimeFigureOut">
               <a:rPr lang="zh-TW" altLang="en-US" smtClean="0"/>
-              <a:t>2017/5/23</a:t>
+              <a:t>2017/6/20</a:t>
             </a:fld>
             <a:endParaRPr lang="zh-TW" altLang="en-US"/>
           </a:p>
@@ -1236,7 +1242,7 @@
           <a:p>
             <a:fld id="{AB2CABD1-DD9B-46C9-AF9D-45F2D6A20CB2}" type="datetimeFigureOut">
               <a:rPr lang="zh-TW" altLang="en-US" smtClean="0"/>
-              <a:t>2017/5/23</a:t>
+              <a:t>2017/6/20</a:t>
             </a:fld>
             <a:endParaRPr lang="zh-TW" altLang="en-US"/>
           </a:p>
@@ -1603,7 +1609,7 @@
           <a:p>
             <a:fld id="{AB2CABD1-DD9B-46C9-AF9D-45F2D6A20CB2}" type="datetimeFigureOut">
               <a:rPr lang="zh-TW" altLang="en-US" smtClean="0"/>
-              <a:t>2017/5/23</a:t>
+              <a:t>2017/6/20</a:t>
             </a:fld>
             <a:endParaRPr lang="zh-TW" altLang="en-US"/>
           </a:p>
@@ -1721,7 +1727,7 @@
           <a:p>
             <a:fld id="{AB2CABD1-DD9B-46C9-AF9D-45F2D6A20CB2}" type="datetimeFigureOut">
               <a:rPr lang="zh-TW" altLang="en-US" smtClean="0"/>
-              <a:t>2017/5/23</a:t>
+              <a:t>2017/6/20</a:t>
             </a:fld>
             <a:endParaRPr lang="zh-TW" altLang="en-US"/>
           </a:p>
@@ -1816,7 +1822,7 @@
           <a:p>
             <a:fld id="{AB2CABD1-DD9B-46C9-AF9D-45F2D6A20CB2}" type="datetimeFigureOut">
               <a:rPr lang="zh-TW" altLang="en-US" smtClean="0"/>
-              <a:t>2017/5/23</a:t>
+              <a:t>2017/6/20</a:t>
             </a:fld>
             <a:endParaRPr lang="zh-TW" altLang="en-US"/>
           </a:p>
@@ -2093,7 +2099,7 @@
           <a:p>
             <a:fld id="{AB2CABD1-DD9B-46C9-AF9D-45F2D6A20CB2}" type="datetimeFigureOut">
               <a:rPr lang="zh-TW" altLang="en-US" smtClean="0"/>
-              <a:t>2017/5/23</a:t>
+              <a:t>2017/6/20</a:t>
             </a:fld>
             <a:endParaRPr lang="zh-TW" altLang="en-US"/>
           </a:p>
@@ -2346,7 +2352,7 @@
           <a:p>
             <a:fld id="{AB2CABD1-DD9B-46C9-AF9D-45F2D6A20CB2}" type="datetimeFigureOut">
               <a:rPr lang="zh-TW" altLang="en-US" smtClean="0"/>
-              <a:t>2017/5/23</a:t>
+              <a:t>2017/6/20</a:t>
             </a:fld>
             <a:endParaRPr lang="zh-TW" altLang="en-US"/>
           </a:p>
@@ -2559,7 +2565,7 @@
           <a:p>
             <a:fld id="{AB2CABD1-DD9B-46C9-AF9D-45F2D6A20CB2}" type="datetimeFigureOut">
               <a:rPr lang="zh-TW" altLang="en-US" smtClean="0"/>
-              <a:t>2017/5/23</a:t>
+              <a:t>2017/6/20</a:t>
             </a:fld>
             <a:endParaRPr lang="zh-TW" altLang="en-US"/>
           </a:p>
@@ -3819,6 +3825,1820 @@
 </p:sld>
 </file>
 
+<file path=ppt/slides/slide2.xml><?xml version="1.0" encoding="utf-8"?>
+<p:sld xmlns:a="http://schemas.openxmlformats.org/drawingml/2006/main" xmlns:r="http://schemas.openxmlformats.org/officeDocument/2006/relationships" xmlns:p="http://schemas.openxmlformats.org/presentationml/2006/main">
+  <p:cSld>
+    <p:spTree>
+      <p:nvGrpSpPr>
+        <p:cNvPr id="1" name=""/>
+        <p:cNvGrpSpPr/>
+        <p:nvPr/>
+      </p:nvGrpSpPr>
+      <p:grpSpPr>
+        <a:xfrm>
+          <a:off x="0" y="0"/>
+          <a:ext cx="0" cy="0"/>
+          <a:chOff x="0" y="0"/>
+          <a:chExt cx="0" cy="0"/>
+        </a:xfrm>
+      </p:grpSpPr>
+      <p:sp>
+        <p:nvSpPr>
+          <p:cNvPr id="4" name="圓角矩形 3"/>
+          <p:cNvSpPr/>
+          <p:nvPr/>
+        </p:nvSpPr>
+        <p:spPr>
+          <a:xfrm>
+            <a:off x="1765300" y="1358900"/>
+            <a:ext cx="9867900" cy="3683000"/>
+          </a:xfrm>
+          <a:prstGeom prst="roundRect">
+            <a:avLst>
+              <a:gd name="adj" fmla="val 12893"/>
+            </a:avLst>
+          </a:prstGeom>
+          <a:ln>
+            <a:prstDash val="dash"/>
+          </a:ln>
+        </p:spPr>
+        <p:style>
+          <a:lnRef idx="2">
+            <a:schemeClr val="accent2"/>
+          </a:lnRef>
+          <a:fillRef idx="1">
+            <a:schemeClr val="lt1"/>
+          </a:fillRef>
+          <a:effectRef idx="0">
+            <a:schemeClr val="accent2"/>
+          </a:effectRef>
+          <a:fontRef idx="minor">
+            <a:schemeClr val="dk1"/>
+          </a:fontRef>
+        </p:style>
+        <p:txBody>
+          <a:bodyPr rtlCol="0" anchor="ctr"/>
+          <a:lstStyle/>
+          <a:p>
+            <a:pPr algn="ctr"/>
+            <a:endParaRPr lang="zh-TW" altLang="en-US"/>
+          </a:p>
+        </p:txBody>
+      </p:sp>
+      <p:sp>
+        <p:nvSpPr>
+          <p:cNvPr id="5" name="矩形 4"/>
+          <p:cNvSpPr/>
+          <p:nvPr/>
+        </p:nvSpPr>
+        <p:spPr>
+          <a:xfrm>
+            <a:off x="4895850" y="984250"/>
+            <a:ext cx="3289300" cy="749300"/>
+          </a:xfrm>
+          <a:prstGeom prst="rect">
+            <a:avLst/>
+          </a:prstGeom>
+        </p:spPr>
+        <p:style>
+          <a:lnRef idx="2">
+            <a:schemeClr val="accent1"/>
+          </a:lnRef>
+          <a:fillRef idx="1">
+            <a:schemeClr val="lt1"/>
+          </a:fillRef>
+          <a:effectRef idx="0">
+            <a:schemeClr val="accent1"/>
+          </a:effectRef>
+          <a:fontRef idx="minor">
+            <a:schemeClr val="dk1"/>
+          </a:fontRef>
+        </p:style>
+        <p:txBody>
+          <a:bodyPr rtlCol="0" anchor="ctr"/>
+          <a:lstStyle/>
+          <a:p>
+            <a:pPr algn="ctr"/>
+            <a:r>
+              <a:rPr lang="en-US" altLang="zh-TW" dirty="0" smtClean="0"/>
+              <a:t>API Gateway</a:t>
+            </a:r>
+            <a:endParaRPr lang="zh-TW" altLang="en-US" dirty="0"/>
+          </a:p>
+        </p:txBody>
+      </p:sp>
+      <p:sp>
+        <p:nvSpPr>
+          <p:cNvPr id="6" name="矩形 5"/>
+          <p:cNvSpPr/>
+          <p:nvPr/>
+        </p:nvSpPr>
+        <p:spPr>
+          <a:xfrm>
+            <a:off x="2260599" y="3006725"/>
+            <a:ext cx="9039225" cy="622300"/>
+          </a:xfrm>
+          <a:prstGeom prst="rect">
+            <a:avLst/>
+          </a:prstGeom>
+        </p:spPr>
+        <p:style>
+          <a:lnRef idx="2">
+            <a:schemeClr val="accent1"/>
+          </a:lnRef>
+          <a:fillRef idx="1">
+            <a:schemeClr val="lt1"/>
+          </a:fillRef>
+          <a:effectRef idx="0">
+            <a:schemeClr val="accent1"/>
+          </a:effectRef>
+          <a:fontRef idx="minor">
+            <a:schemeClr val="dk1"/>
+          </a:fontRef>
+        </p:style>
+        <p:txBody>
+          <a:bodyPr rtlCol="0" anchor="ctr"/>
+          <a:lstStyle/>
+          <a:p>
+            <a:pPr algn="ctr"/>
+            <a:r>
+              <a:rPr lang="en-US" altLang="zh-TW" dirty="0" smtClean="0"/>
+              <a:t>Message / Event-Driven / IPC</a:t>
+            </a:r>
+            <a:endParaRPr lang="zh-TW" altLang="en-US" dirty="0"/>
+          </a:p>
+        </p:txBody>
+      </p:sp>
+      <p:sp>
+        <p:nvSpPr>
+          <p:cNvPr id="7" name="矩形 6"/>
+          <p:cNvSpPr/>
+          <p:nvPr/>
+        </p:nvSpPr>
+        <p:spPr>
+          <a:xfrm>
+            <a:off x="2260600" y="1482725"/>
+            <a:ext cx="2438400" cy="749300"/>
+          </a:xfrm>
+          <a:prstGeom prst="rect">
+            <a:avLst/>
+          </a:prstGeom>
+        </p:spPr>
+        <p:style>
+          <a:lnRef idx="2">
+            <a:schemeClr val="accent1"/>
+          </a:lnRef>
+          <a:fillRef idx="1">
+            <a:schemeClr val="lt1"/>
+          </a:fillRef>
+          <a:effectRef idx="0">
+            <a:schemeClr val="accent1"/>
+          </a:effectRef>
+          <a:fontRef idx="minor">
+            <a:schemeClr val="dk1"/>
+          </a:fontRef>
+        </p:style>
+        <p:txBody>
+          <a:bodyPr rtlCol="0" anchor="ctr"/>
+          <a:lstStyle/>
+          <a:p>
+            <a:pPr algn="ctr"/>
+            <a:r>
+              <a:rPr lang="en-US" altLang="zh-TW" dirty="0" smtClean="0"/>
+              <a:t>Service Discovery</a:t>
+            </a:r>
+            <a:endParaRPr lang="zh-TW" altLang="en-US" dirty="0"/>
+          </a:p>
+        </p:txBody>
+      </p:sp>
+      <p:sp>
+        <p:nvSpPr>
+          <p:cNvPr id="8" name="圓柱 7"/>
+          <p:cNvSpPr/>
+          <p:nvPr/>
+        </p:nvSpPr>
+        <p:spPr>
+          <a:xfrm>
+            <a:off x="1854200" y="5222875"/>
+            <a:ext cx="2362200" cy="1054100"/>
+          </a:xfrm>
+          <a:prstGeom prst="can">
+            <a:avLst/>
+          </a:prstGeom>
+        </p:spPr>
+        <p:style>
+          <a:lnRef idx="2">
+            <a:schemeClr val="accent3"/>
+          </a:lnRef>
+          <a:fillRef idx="1">
+            <a:schemeClr val="lt1"/>
+          </a:fillRef>
+          <a:effectRef idx="0">
+            <a:schemeClr val="accent3"/>
+          </a:effectRef>
+          <a:fontRef idx="minor">
+            <a:schemeClr val="dk1"/>
+          </a:fontRef>
+        </p:style>
+        <p:txBody>
+          <a:bodyPr rtlCol="0" anchor="ctr"/>
+          <a:lstStyle/>
+          <a:p>
+            <a:pPr algn="ctr"/>
+            <a:r>
+              <a:rPr lang="en-US" altLang="zh-TW" dirty="0" smtClean="0"/>
+              <a:t>Storage</a:t>
+            </a:r>
+            <a:endParaRPr lang="zh-TW" altLang="en-US" dirty="0"/>
+          </a:p>
+        </p:txBody>
+      </p:sp>
+      <p:sp>
+        <p:nvSpPr>
+          <p:cNvPr id="9" name="圓柱 8"/>
+          <p:cNvSpPr/>
+          <p:nvPr/>
+        </p:nvSpPr>
+        <p:spPr>
+          <a:xfrm>
+            <a:off x="8953500" y="5222875"/>
+            <a:ext cx="2362200" cy="1054100"/>
+          </a:xfrm>
+          <a:prstGeom prst="can">
+            <a:avLst/>
+          </a:prstGeom>
+        </p:spPr>
+        <p:style>
+          <a:lnRef idx="2">
+            <a:schemeClr val="accent1"/>
+          </a:lnRef>
+          <a:fillRef idx="1">
+            <a:schemeClr val="lt1"/>
+          </a:fillRef>
+          <a:effectRef idx="0">
+            <a:schemeClr val="accent1"/>
+          </a:effectRef>
+          <a:fontRef idx="minor">
+            <a:schemeClr val="dk1"/>
+          </a:fontRef>
+        </p:style>
+        <p:txBody>
+          <a:bodyPr rtlCol="0" anchor="ctr"/>
+          <a:lstStyle/>
+          <a:p>
+            <a:pPr algn="ctr"/>
+            <a:r>
+              <a:rPr lang="en-US" altLang="zh-TW" dirty="0" smtClean="0"/>
+              <a:t>Logs</a:t>
+            </a:r>
+            <a:endParaRPr lang="zh-TW" altLang="en-US" dirty="0"/>
+          </a:p>
+        </p:txBody>
+      </p:sp>
+      <p:sp>
+        <p:nvSpPr>
+          <p:cNvPr id="10" name="圓柱 9"/>
+          <p:cNvSpPr/>
+          <p:nvPr/>
+        </p:nvSpPr>
+        <p:spPr>
+          <a:xfrm>
+            <a:off x="4330700" y="5222875"/>
+            <a:ext cx="2362200" cy="1054100"/>
+          </a:xfrm>
+          <a:prstGeom prst="can">
+            <a:avLst/>
+          </a:prstGeom>
+        </p:spPr>
+        <p:style>
+          <a:lnRef idx="2">
+            <a:schemeClr val="accent3"/>
+          </a:lnRef>
+          <a:fillRef idx="1">
+            <a:schemeClr val="lt1"/>
+          </a:fillRef>
+          <a:effectRef idx="0">
+            <a:schemeClr val="accent3"/>
+          </a:effectRef>
+          <a:fontRef idx="minor">
+            <a:schemeClr val="dk1"/>
+          </a:fontRef>
+        </p:style>
+        <p:txBody>
+          <a:bodyPr rtlCol="0" anchor="ctr"/>
+          <a:lstStyle/>
+          <a:p>
+            <a:pPr algn="ctr"/>
+            <a:r>
+              <a:rPr lang="en-US" altLang="zh-TW" dirty="0" smtClean="0"/>
+              <a:t>Storage</a:t>
+            </a:r>
+            <a:endParaRPr lang="zh-TW" altLang="en-US" dirty="0"/>
+          </a:p>
+        </p:txBody>
+      </p:sp>
+      <p:sp>
+        <p:nvSpPr>
+          <p:cNvPr id="12" name="圓角矩形 11"/>
+          <p:cNvSpPr/>
+          <p:nvPr/>
+        </p:nvSpPr>
+        <p:spPr>
+          <a:xfrm>
+            <a:off x="2260600" y="2374900"/>
+            <a:ext cx="533400" cy="482600"/>
+          </a:xfrm>
+          <a:prstGeom prst="roundRect">
+            <a:avLst/>
+          </a:prstGeom>
+        </p:spPr>
+        <p:style>
+          <a:lnRef idx="2">
+            <a:schemeClr val="accent6"/>
+          </a:lnRef>
+          <a:fillRef idx="1">
+            <a:schemeClr val="lt1"/>
+          </a:fillRef>
+          <a:effectRef idx="0">
+            <a:schemeClr val="accent6"/>
+          </a:effectRef>
+          <a:fontRef idx="minor">
+            <a:schemeClr val="dk1"/>
+          </a:fontRef>
+        </p:style>
+        <p:txBody>
+          <a:bodyPr rtlCol="0" anchor="ctr"/>
+          <a:lstStyle/>
+          <a:p>
+            <a:pPr algn="ctr"/>
+            <a:endParaRPr lang="zh-TW" altLang="en-US"/>
+          </a:p>
+        </p:txBody>
+      </p:sp>
+      <p:sp>
+        <p:nvSpPr>
+          <p:cNvPr id="13" name="圓角矩形 12"/>
+          <p:cNvSpPr/>
+          <p:nvPr/>
+        </p:nvSpPr>
+        <p:spPr>
+          <a:xfrm>
+            <a:off x="2946400" y="2374900"/>
+            <a:ext cx="533400" cy="482600"/>
+          </a:xfrm>
+          <a:prstGeom prst="roundRect">
+            <a:avLst/>
+          </a:prstGeom>
+        </p:spPr>
+        <p:style>
+          <a:lnRef idx="2">
+            <a:schemeClr val="accent6"/>
+          </a:lnRef>
+          <a:fillRef idx="1">
+            <a:schemeClr val="lt1"/>
+          </a:fillRef>
+          <a:effectRef idx="0">
+            <a:schemeClr val="accent6"/>
+          </a:effectRef>
+          <a:fontRef idx="minor">
+            <a:schemeClr val="dk1"/>
+          </a:fontRef>
+        </p:style>
+        <p:txBody>
+          <a:bodyPr rtlCol="0" anchor="ctr"/>
+          <a:lstStyle/>
+          <a:p>
+            <a:pPr algn="ctr"/>
+            <a:endParaRPr lang="zh-TW" altLang="en-US"/>
+          </a:p>
+        </p:txBody>
+      </p:sp>
+      <p:sp>
+        <p:nvSpPr>
+          <p:cNvPr id="14" name="圓角矩形 13"/>
+          <p:cNvSpPr/>
+          <p:nvPr/>
+        </p:nvSpPr>
+        <p:spPr>
+          <a:xfrm>
+            <a:off x="3644900" y="2374900"/>
+            <a:ext cx="533400" cy="482600"/>
+          </a:xfrm>
+          <a:prstGeom prst="roundRect">
+            <a:avLst/>
+          </a:prstGeom>
+        </p:spPr>
+        <p:style>
+          <a:lnRef idx="2">
+            <a:schemeClr val="accent6"/>
+          </a:lnRef>
+          <a:fillRef idx="1">
+            <a:schemeClr val="lt1"/>
+          </a:fillRef>
+          <a:effectRef idx="0">
+            <a:schemeClr val="accent6"/>
+          </a:effectRef>
+          <a:fontRef idx="minor">
+            <a:schemeClr val="dk1"/>
+          </a:fontRef>
+        </p:style>
+        <p:txBody>
+          <a:bodyPr rtlCol="0" anchor="ctr"/>
+          <a:lstStyle/>
+          <a:p>
+            <a:pPr algn="ctr"/>
+            <a:endParaRPr lang="zh-TW" altLang="en-US"/>
+          </a:p>
+        </p:txBody>
+      </p:sp>
+      <p:sp>
+        <p:nvSpPr>
+          <p:cNvPr id="15" name="圓角矩形 14"/>
+          <p:cNvSpPr/>
+          <p:nvPr/>
+        </p:nvSpPr>
+        <p:spPr>
+          <a:xfrm>
+            <a:off x="4362450" y="2374900"/>
+            <a:ext cx="533400" cy="482600"/>
+          </a:xfrm>
+          <a:prstGeom prst="roundRect">
+            <a:avLst/>
+          </a:prstGeom>
+        </p:spPr>
+        <p:style>
+          <a:lnRef idx="2">
+            <a:schemeClr val="accent6"/>
+          </a:lnRef>
+          <a:fillRef idx="1">
+            <a:schemeClr val="lt1"/>
+          </a:fillRef>
+          <a:effectRef idx="0">
+            <a:schemeClr val="accent6"/>
+          </a:effectRef>
+          <a:fontRef idx="minor">
+            <a:schemeClr val="dk1"/>
+          </a:fontRef>
+        </p:style>
+        <p:txBody>
+          <a:bodyPr rtlCol="0" anchor="ctr"/>
+          <a:lstStyle/>
+          <a:p>
+            <a:pPr algn="ctr"/>
+            <a:endParaRPr lang="zh-TW" altLang="en-US"/>
+          </a:p>
+        </p:txBody>
+      </p:sp>
+      <p:sp>
+        <p:nvSpPr>
+          <p:cNvPr id="16" name="圓角矩形 15"/>
+          <p:cNvSpPr/>
+          <p:nvPr/>
+        </p:nvSpPr>
+        <p:spPr>
+          <a:xfrm>
+            <a:off x="5080000" y="2374900"/>
+            <a:ext cx="533400" cy="482600"/>
+          </a:xfrm>
+          <a:prstGeom prst="roundRect">
+            <a:avLst/>
+          </a:prstGeom>
+        </p:spPr>
+        <p:style>
+          <a:lnRef idx="2">
+            <a:schemeClr val="accent6"/>
+          </a:lnRef>
+          <a:fillRef idx="1">
+            <a:schemeClr val="lt1"/>
+          </a:fillRef>
+          <a:effectRef idx="0">
+            <a:schemeClr val="accent6"/>
+          </a:effectRef>
+          <a:fontRef idx="minor">
+            <a:schemeClr val="dk1"/>
+          </a:fontRef>
+        </p:style>
+        <p:txBody>
+          <a:bodyPr rtlCol="0" anchor="ctr"/>
+          <a:lstStyle/>
+          <a:p>
+            <a:pPr algn="ctr"/>
+            <a:endParaRPr lang="zh-TW" altLang="en-US"/>
+          </a:p>
+        </p:txBody>
+      </p:sp>
+      <p:sp>
+        <p:nvSpPr>
+          <p:cNvPr id="17" name="圓角矩形 16"/>
+          <p:cNvSpPr/>
+          <p:nvPr/>
+        </p:nvSpPr>
+        <p:spPr>
+          <a:xfrm>
+            <a:off x="5797550" y="2374900"/>
+            <a:ext cx="533400" cy="482600"/>
+          </a:xfrm>
+          <a:prstGeom prst="roundRect">
+            <a:avLst/>
+          </a:prstGeom>
+        </p:spPr>
+        <p:style>
+          <a:lnRef idx="2">
+            <a:schemeClr val="accent6"/>
+          </a:lnRef>
+          <a:fillRef idx="1">
+            <a:schemeClr val="lt1"/>
+          </a:fillRef>
+          <a:effectRef idx="0">
+            <a:schemeClr val="accent6"/>
+          </a:effectRef>
+          <a:fontRef idx="minor">
+            <a:schemeClr val="dk1"/>
+          </a:fontRef>
+        </p:style>
+        <p:txBody>
+          <a:bodyPr rtlCol="0" anchor="ctr"/>
+          <a:lstStyle/>
+          <a:p>
+            <a:pPr algn="ctr"/>
+            <a:endParaRPr lang="zh-TW" altLang="en-US"/>
+          </a:p>
+        </p:txBody>
+      </p:sp>
+      <p:sp>
+        <p:nvSpPr>
+          <p:cNvPr id="18" name="圓角矩形 17"/>
+          <p:cNvSpPr/>
+          <p:nvPr/>
+        </p:nvSpPr>
+        <p:spPr>
+          <a:xfrm>
+            <a:off x="6483350" y="2374900"/>
+            <a:ext cx="533400" cy="482600"/>
+          </a:xfrm>
+          <a:prstGeom prst="roundRect">
+            <a:avLst/>
+          </a:prstGeom>
+        </p:spPr>
+        <p:style>
+          <a:lnRef idx="2">
+            <a:schemeClr val="accent6"/>
+          </a:lnRef>
+          <a:fillRef idx="1">
+            <a:schemeClr val="lt1"/>
+          </a:fillRef>
+          <a:effectRef idx="0">
+            <a:schemeClr val="accent6"/>
+          </a:effectRef>
+          <a:fontRef idx="minor">
+            <a:schemeClr val="dk1"/>
+          </a:fontRef>
+        </p:style>
+        <p:txBody>
+          <a:bodyPr rtlCol="0" anchor="ctr"/>
+          <a:lstStyle/>
+          <a:p>
+            <a:pPr algn="ctr"/>
+            <a:endParaRPr lang="zh-TW" altLang="en-US"/>
+          </a:p>
+        </p:txBody>
+      </p:sp>
+      <p:sp>
+        <p:nvSpPr>
+          <p:cNvPr id="19" name="圓角矩形 18"/>
+          <p:cNvSpPr/>
+          <p:nvPr/>
+        </p:nvSpPr>
+        <p:spPr>
+          <a:xfrm>
+            <a:off x="7181850" y="2374900"/>
+            <a:ext cx="533400" cy="482600"/>
+          </a:xfrm>
+          <a:prstGeom prst="roundRect">
+            <a:avLst/>
+          </a:prstGeom>
+        </p:spPr>
+        <p:style>
+          <a:lnRef idx="2">
+            <a:schemeClr val="accent6"/>
+          </a:lnRef>
+          <a:fillRef idx="1">
+            <a:schemeClr val="lt1"/>
+          </a:fillRef>
+          <a:effectRef idx="0">
+            <a:schemeClr val="accent6"/>
+          </a:effectRef>
+          <a:fontRef idx="minor">
+            <a:schemeClr val="dk1"/>
+          </a:fontRef>
+        </p:style>
+        <p:txBody>
+          <a:bodyPr rtlCol="0" anchor="ctr"/>
+          <a:lstStyle/>
+          <a:p>
+            <a:pPr algn="ctr"/>
+            <a:endParaRPr lang="zh-TW" altLang="en-US"/>
+          </a:p>
+        </p:txBody>
+      </p:sp>
+      <p:sp>
+        <p:nvSpPr>
+          <p:cNvPr id="20" name="圓角矩形 19"/>
+          <p:cNvSpPr/>
+          <p:nvPr/>
+        </p:nvSpPr>
+        <p:spPr>
+          <a:xfrm>
+            <a:off x="7899400" y="2374900"/>
+            <a:ext cx="533400" cy="482600"/>
+          </a:xfrm>
+          <a:prstGeom prst="roundRect">
+            <a:avLst/>
+          </a:prstGeom>
+        </p:spPr>
+        <p:style>
+          <a:lnRef idx="2">
+            <a:schemeClr val="accent6"/>
+          </a:lnRef>
+          <a:fillRef idx="1">
+            <a:schemeClr val="lt1"/>
+          </a:fillRef>
+          <a:effectRef idx="0">
+            <a:schemeClr val="accent6"/>
+          </a:effectRef>
+          <a:fontRef idx="minor">
+            <a:schemeClr val="dk1"/>
+          </a:fontRef>
+        </p:style>
+        <p:txBody>
+          <a:bodyPr rtlCol="0" anchor="ctr"/>
+          <a:lstStyle/>
+          <a:p>
+            <a:pPr algn="ctr"/>
+            <a:endParaRPr lang="zh-TW" altLang="en-US"/>
+          </a:p>
+        </p:txBody>
+      </p:sp>
+      <p:sp>
+        <p:nvSpPr>
+          <p:cNvPr id="21" name="圓角矩形 20"/>
+          <p:cNvSpPr/>
+          <p:nvPr/>
+        </p:nvSpPr>
+        <p:spPr>
+          <a:xfrm>
+            <a:off x="8616950" y="2374900"/>
+            <a:ext cx="533400" cy="482600"/>
+          </a:xfrm>
+          <a:prstGeom prst="roundRect">
+            <a:avLst/>
+          </a:prstGeom>
+        </p:spPr>
+        <p:style>
+          <a:lnRef idx="2">
+            <a:schemeClr val="accent6"/>
+          </a:lnRef>
+          <a:fillRef idx="1">
+            <a:schemeClr val="lt1"/>
+          </a:fillRef>
+          <a:effectRef idx="0">
+            <a:schemeClr val="accent6"/>
+          </a:effectRef>
+          <a:fontRef idx="minor">
+            <a:schemeClr val="dk1"/>
+          </a:fontRef>
+        </p:style>
+        <p:txBody>
+          <a:bodyPr rtlCol="0" anchor="ctr"/>
+          <a:lstStyle/>
+          <a:p>
+            <a:pPr algn="ctr"/>
+            <a:endParaRPr lang="zh-TW" altLang="en-US"/>
+          </a:p>
+        </p:txBody>
+      </p:sp>
+      <p:sp>
+        <p:nvSpPr>
+          <p:cNvPr id="32" name="圓角矩形 31"/>
+          <p:cNvSpPr/>
+          <p:nvPr/>
+        </p:nvSpPr>
+        <p:spPr>
+          <a:xfrm>
+            <a:off x="9331325" y="2374900"/>
+            <a:ext cx="533400" cy="482600"/>
+          </a:xfrm>
+          <a:prstGeom prst="roundRect">
+            <a:avLst/>
+          </a:prstGeom>
+        </p:spPr>
+        <p:style>
+          <a:lnRef idx="2">
+            <a:schemeClr val="accent6"/>
+          </a:lnRef>
+          <a:fillRef idx="1">
+            <a:schemeClr val="lt1"/>
+          </a:fillRef>
+          <a:effectRef idx="0">
+            <a:schemeClr val="accent6"/>
+          </a:effectRef>
+          <a:fontRef idx="minor">
+            <a:schemeClr val="dk1"/>
+          </a:fontRef>
+        </p:style>
+        <p:txBody>
+          <a:bodyPr rtlCol="0" anchor="ctr"/>
+          <a:lstStyle/>
+          <a:p>
+            <a:pPr algn="ctr"/>
+            <a:endParaRPr lang="zh-TW" altLang="en-US"/>
+          </a:p>
+        </p:txBody>
+      </p:sp>
+      <p:sp>
+        <p:nvSpPr>
+          <p:cNvPr id="33" name="圓角矩形 32"/>
+          <p:cNvSpPr/>
+          <p:nvPr/>
+        </p:nvSpPr>
+        <p:spPr>
+          <a:xfrm>
+            <a:off x="10048875" y="2374900"/>
+            <a:ext cx="533400" cy="482600"/>
+          </a:xfrm>
+          <a:prstGeom prst="roundRect">
+            <a:avLst/>
+          </a:prstGeom>
+        </p:spPr>
+        <p:style>
+          <a:lnRef idx="2">
+            <a:schemeClr val="accent6"/>
+          </a:lnRef>
+          <a:fillRef idx="1">
+            <a:schemeClr val="lt1"/>
+          </a:fillRef>
+          <a:effectRef idx="0">
+            <a:schemeClr val="accent6"/>
+          </a:effectRef>
+          <a:fontRef idx="minor">
+            <a:schemeClr val="dk1"/>
+          </a:fontRef>
+        </p:style>
+        <p:txBody>
+          <a:bodyPr rtlCol="0" anchor="ctr"/>
+          <a:lstStyle/>
+          <a:p>
+            <a:pPr algn="ctr"/>
+            <a:endParaRPr lang="zh-TW" altLang="en-US"/>
+          </a:p>
+        </p:txBody>
+      </p:sp>
+      <p:sp>
+        <p:nvSpPr>
+          <p:cNvPr id="34" name="圓角矩形 33"/>
+          <p:cNvSpPr/>
+          <p:nvPr/>
+        </p:nvSpPr>
+        <p:spPr>
+          <a:xfrm>
+            <a:off x="10766425" y="2374900"/>
+            <a:ext cx="533400" cy="482600"/>
+          </a:xfrm>
+          <a:prstGeom prst="roundRect">
+            <a:avLst/>
+          </a:prstGeom>
+        </p:spPr>
+        <p:style>
+          <a:lnRef idx="2">
+            <a:schemeClr val="accent6"/>
+          </a:lnRef>
+          <a:fillRef idx="1">
+            <a:schemeClr val="lt1"/>
+          </a:fillRef>
+          <a:effectRef idx="0">
+            <a:schemeClr val="accent6"/>
+          </a:effectRef>
+          <a:fontRef idx="minor">
+            <a:schemeClr val="dk1"/>
+          </a:fontRef>
+        </p:style>
+        <p:txBody>
+          <a:bodyPr rtlCol="0" anchor="ctr"/>
+          <a:lstStyle/>
+          <a:p>
+            <a:pPr algn="ctr"/>
+            <a:endParaRPr lang="zh-TW" altLang="en-US"/>
+          </a:p>
+        </p:txBody>
+      </p:sp>
+      <p:sp>
+        <p:nvSpPr>
+          <p:cNvPr id="35" name="圓角矩形 34"/>
+          <p:cNvSpPr/>
+          <p:nvPr/>
+        </p:nvSpPr>
+        <p:spPr>
+          <a:xfrm>
+            <a:off x="2260600" y="3775075"/>
+            <a:ext cx="533400" cy="482600"/>
+          </a:xfrm>
+          <a:prstGeom prst="roundRect">
+            <a:avLst/>
+          </a:prstGeom>
+        </p:spPr>
+        <p:style>
+          <a:lnRef idx="2">
+            <a:schemeClr val="accent6"/>
+          </a:lnRef>
+          <a:fillRef idx="1">
+            <a:schemeClr val="lt1"/>
+          </a:fillRef>
+          <a:effectRef idx="0">
+            <a:schemeClr val="accent6"/>
+          </a:effectRef>
+          <a:fontRef idx="minor">
+            <a:schemeClr val="dk1"/>
+          </a:fontRef>
+        </p:style>
+        <p:txBody>
+          <a:bodyPr rtlCol="0" anchor="ctr"/>
+          <a:lstStyle/>
+          <a:p>
+            <a:pPr algn="ctr"/>
+            <a:endParaRPr lang="zh-TW" altLang="en-US"/>
+          </a:p>
+        </p:txBody>
+      </p:sp>
+      <p:sp>
+        <p:nvSpPr>
+          <p:cNvPr id="36" name="圓角矩形 35"/>
+          <p:cNvSpPr/>
+          <p:nvPr/>
+        </p:nvSpPr>
+        <p:spPr>
+          <a:xfrm>
+            <a:off x="2946400" y="3775075"/>
+            <a:ext cx="533400" cy="482600"/>
+          </a:xfrm>
+          <a:prstGeom prst="roundRect">
+            <a:avLst/>
+          </a:prstGeom>
+        </p:spPr>
+        <p:style>
+          <a:lnRef idx="2">
+            <a:schemeClr val="accent6"/>
+          </a:lnRef>
+          <a:fillRef idx="1">
+            <a:schemeClr val="lt1"/>
+          </a:fillRef>
+          <a:effectRef idx="0">
+            <a:schemeClr val="accent6"/>
+          </a:effectRef>
+          <a:fontRef idx="minor">
+            <a:schemeClr val="dk1"/>
+          </a:fontRef>
+        </p:style>
+        <p:txBody>
+          <a:bodyPr rtlCol="0" anchor="ctr"/>
+          <a:lstStyle/>
+          <a:p>
+            <a:pPr algn="ctr"/>
+            <a:endParaRPr lang="zh-TW" altLang="en-US"/>
+          </a:p>
+        </p:txBody>
+      </p:sp>
+      <p:sp>
+        <p:nvSpPr>
+          <p:cNvPr id="37" name="圓角矩形 36"/>
+          <p:cNvSpPr/>
+          <p:nvPr/>
+        </p:nvSpPr>
+        <p:spPr>
+          <a:xfrm>
+            <a:off x="3644900" y="3775075"/>
+            <a:ext cx="533400" cy="482600"/>
+          </a:xfrm>
+          <a:prstGeom prst="roundRect">
+            <a:avLst/>
+          </a:prstGeom>
+        </p:spPr>
+        <p:style>
+          <a:lnRef idx="2">
+            <a:schemeClr val="accent6"/>
+          </a:lnRef>
+          <a:fillRef idx="1">
+            <a:schemeClr val="lt1"/>
+          </a:fillRef>
+          <a:effectRef idx="0">
+            <a:schemeClr val="accent6"/>
+          </a:effectRef>
+          <a:fontRef idx="minor">
+            <a:schemeClr val="dk1"/>
+          </a:fontRef>
+        </p:style>
+        <p:txBody>
+          <a:bodyPr rtlCol="0" anchor="ctr"/>
+          <a:lstStyle/>
+          <a:p>
+            <a:pPr algn="ctr"/>
+            <a:endParaRPr lang="zh-TW" altLang="en-US"/>
+          </a:p>
+        </p:txBody>
+      </p:sp>
+      <p:sp>
+        <p:nvSpPr>
+          <p:cNvPr id="38" name="圓角矩形 37"/>
+          <p:cNvSpPr/>
+          <p:nvPr/>
+        </p:nvSpPr>
+        <p:spPr>
+          <a:xfrm>
+            <a:off x="4362450" y="3775075"/>
+            <a:ext cx="533400" cy="482600"/>
+          </a:xfrm>
+          <a:prstGeom prst="roundRect">
+            <a:avLst/>
+          </a:prstGeom>
+        </p:spPr>
+        <p:style>
+          <a:lnRef idx="2">
+            <a:schemeClr val="accent6"/>
+          </a:lnRef>
+          <a:fillRef idx="1">
+            <a:schemeClr val="lt1"/>
+          </a:fillRef>
+          <a:effectRef idx="0">
+            <a:schemeClr val="accent6"/>
+          </a:effectRef>
+          <a:fontRef idx="minor">
+            <a:schemeClr val="dk1"/>
+          </a:fontRef>
+        </p:style>
+        <p:txBody>
+          <a:bodyPr rtlCol="0" anchor="ctr"/>
+          <a:lstStyle/>
+          <a:p>
+            <a:pPr algn="ctr"/>
+            <a:endParaRPr lang="zh-TW" altLang="en-US"/>
+          </a:p>
+        </p:txBody>
+      </p:sp>
+      <p:sp>
+        <p:nvSpPr>
+          <p:cNvPr id="39" name="圓角矩形 38"/>
+          <p:cNvSpPr/>
+          <p:nvPr/>
+        </p:nvSpPr>
+        <p:spPr>
+          <a:xfrm>
+            <a:off x="5080000" y="3775075"/>
+            <a:ext cx="533400" cy="482600"/>
+          </a:xfrm>
+          <a:prstGeom prst="roundRect">
+            <a:avLst/>
+          </a:prstGeom>
+        </p:spPr>
+        <p:style>
+          <a:lnRef idx="2">
+            <a:schemeClr val="accent6"/>
+          </a:lnRef>
+          <a:fillRef idx="1">
+            <a:schemeClr val="lt1"/>
+          </a:fillRef>
+          <a:effectRef idx="0">
+            <a:schemeClr val="accent6"/>
+          </a:effectRef>
+          <a:fontRef idx="minor">
+            <a:schemeClr val="dk1"/>
+          </a:fontRef>
+        </p:style>
+        <p:txBody>
+          <a:bodyPr rtlCol="0" anchor="ctr"/>
+          <a:lstStyle/>
+          <a:p>
+            <a:pPr algn="ctr"/>
+            <a:endParaRPr lang="zh-TW" altLang="en-US"/>
+          </a:p>
+        </p:txBody>
+      </p:sp>
+      <p:sp>
+        <p:nvSpPr>
+          <p:cNvPr id="40" name="圓角矩形 39"/>
+          <p:cNvSpPr/>
+          <p:nvPr/>
+        </p:nvSpPr>
+        <p:spPr>
+          <a:xfrm>
+            <a:off x="5797550" y="3775075"/>
+            <a:ext cx="533400" cy="482600"/>
+          </a:xfrm>
+          <a:prstGeom prst="roundRect">
+            <a:avLst/>
+          </a:prstGeom>
+        </p:spPr>
+        <p:style>
+          <a:lnRef idx="2">
+            <a:schemeClr val="accent6"/>
+          </a:lnRef>
+          <a:fillRef idx="1">
+            <a:schemeClr val="lt1"/>
+          </a:fillRef>
+          <a:effectRef idx="0">
+            <a:schemeClr val="accent6"/>
+          </a:effectRef>
+          <a:fontRef idx="minor">
+            <a:schemeClr val="dk1"/>
+          </a:fontRef>
+        </p:style>
+        <p:txBody>
+          <a:bodyPr rtlCol="0" anchor="ctr"/>
+          <a:lstStyle/>
+          <a:p>
+            <a:pPr algn="ctr"/>
+            <a:endParaRPr lang="zh-TW" altLang="en-US"/>
+          </a:p>
+        </p:txBody>
+      </p:sp>
+      <p:sp>
+        <p:nvSpPr>
+          <p:cNvPr id="41" name="圓角矩形 40"/>
+          <p:cNvSpPr/>
+          <p:nvPr/>
+        </p:nvSpPr>
+        <p:spPr>
+          <a:xfrm>
+            <a:off x="6483350" y="3775075"/>
+            <a:ext cx="533400" cy="482600"/>
+          </a:xfrm>
+          <a:prstGeom prst="roundRect">
+            <a:avLst/>
+          </a:prstGeom>
+        </p:spPr>
+        <p:style>
+          <a:lnRef idx="2">
+            <a:schemeClr val="accent6"/>
+          </a:lnRef>
+          <a:fillRef idx="1">
+            <a:schemeClr val="lt1"/>
+          </a:fillRef>
+          <a:effectRef idx="0">
+            <a:schemeClr val="accent6"/>
+          </a:effectRef>
+          <a:fontRef idx="minor">
+            <a:schemeClr val="dk1"/>
+          </a:fontRef>
+        </p:style>
+        <p:txBody>
+          <a:bodyPr rtlCol="0" anchor="ctr"/>
+          <a:lstStyle/>
+          <a:p>
+            <a:pPr algn="ctr"/>
+            <a:endParaRPr lang="zh-TW" altLang="en-US"/>
+          </a:p>
+        </p:txBody>
+      </p:sp>
+      <p:sp>
+        <p:nvSpPr>
+          <p:cNvPr id="42" name="圓角矩形 41"/>
+          <p:cNvSpPr/>
+          <p:nvPr/>
+        </p:nvSpPr>
+        <p:spPr>
+          <a:xfrm>
+            <a:off x="7181850" y="3775075"/>
+            <a:ext cx="533400" cy="482600"/>
+          </a:xfrm>
+          <a:prstGeom prst="roundRect">
+            <a:avLst/>
+          </a:prstGeom>
+        </p:spPr>
+        <p:style>
+          <a:lnRef idx="2">
+            <a:schemeClr val="accent6"/>
+          </a:lnRef>
+          <a:fillRef idx="1">
+            <a:schemeClr val="lt1"/>
+          </a:fillRef>
+          <a:effectRef idx="0">
+            <a:schemeClr val="accent6"/>
+          </a:effectRef>
+          <a:fontRef idx="minor">
+            <a:schemeClr val="dk1"/>
+          </a:fontRef>
+        </p:style>
+        <p:txBody>
+          <a:bodyPr rtlCol="0" anchor="ctr"/>
+          <a:lstStyle/>
+          <a:p>
+            <a:pPr algn="ctr"/>
+            <a:endParaRPr lang="zh-TW" altLang="en-US"/>
+          </a:p>
+        </p:txBody>
+      </p:sp>
+      <p:sp>
+        <p:nvSpPr>
+          <p:cNvPr id="43" name="圓角矩形 42"/>
+          <p:cNvSpPr/>
+          <p:nvPr/>
+        </p:nvSpPr>
+        <p:spPr>
+          <a:xfrm>
+            <a:off x="7899400" y="3775075"/>
+            <a:ext cx="533400" cy="482600"/>
+          </a:xfrm>
+          <a:prstGeom prst="roundRect">
+            <a:avLst/>
+          </a:prstGeom>
+        </p:spPr>
+        <p:style>
+          <a:lnRef idx="2">
+            <a:schemeClr val="accent6"/>
+          </a:lnRef>
+          <a:fillRef idx="1">
+            <a:schemeClr val="lt1"/>
+          </a:fillRef>
+          <a:effectRef idx="0">
+            <a:schemeClr val="accent6"/>
+          </a:effectRef>
+          <a:fontRef idx="minor">
+            <a:schemeClr val="dk1"/>
+          </a:fontRef>
+        </p:style>
+        <p:txBody>
+          <a:bodyPr rtlCol="0" anchor="ctr"/>
+          <a:lstStyle/>
+          <a:p>
+            <a:pPr algn="ctr"/>
+            <a:endParaRPr lang="zh-TW" altLang="en-US"/>
+          </a:p>
+        </p:txBody>
+      </p:sp>
+      <p:sp>
+        <p:nvSpPr>
+          <p:cNvPr id="44" name="圓角矩形 43"/>
+          <p:cNvSpPr/>
+          <p:nvPr/>
+        </p:nvSpPr>
+        <p:spPr>
+          <a:xfrm>
+            <a:off x="8616950" y="3775075"/>
+            <a:ext cx="533400" cy="482600"/>
+          </a:xfrm>
+          <a:prstGeom prst="roundRect">
+            <a:avLst/>
+          </a:prstGeom>
+        </p:spPr>
+        <p:style>
+          <a:lnRef idx="2">
+            <a:schemeClr val="accent6"/>
+          </a:lnRef>
+          <a:fillRef idx="1">
+            <a:schemeClr val="lt1"/>
+          </a:fillRef>
+          <a:effectRef idx="0">
+            <a:schemeClr val="accent6"/>
+          </a:effectRef>
+          <a:fontRef idx="minor">
+            <a:schemeClr val="dk1"/>
+          </a:fontRef>
+        </p:style>
+        <p:txBody>
+          <a:bodyPr rtlCol="0" anchor="ctr"/>
+          <a:lstStyle/>
+          <a:p>
+            <a:pPr algn="ctr"/>
+            <a:endParaRPr lang="zh-TW" altLang="en-US"/>
+          </a:p>
+        </p:txBody>
+      </p:sp>
+      <p:sp>
+        <p:nvSpPr>
+          <p:cNvPr id="45" name="圓角矩形 44"/>
+          <p:cNvSpPr/>
+          <p:nvPr/>
+        </p:nvSpPr>
+        <p:spPr>
+          <a:xfrm>
+            <a:off x="9331325" y="3775075"/>
+            <a:ext cx="533400" cy="482600"/>
+          </a:xfrm>
+          <a:prstGeom prst="roundRect">
+            <a:avLst/>
+          </a:prstGeom>
+        </p:spPr>
+        <p:style>
+          <a:lnRef idx="2">
+            <a:schemeClr val="accent6"/>
+          </a:lnRef>
+          <a:fillRef idx="1">
+            <a:schemeClr val="lt1"/>
+          </a:fillRef>
+          <a:effectRef idx="0">
+            <a:schemeClr val="accent6"/>
+          </a:effectRef>
+          <a:fontRef idx="minor">
+            <a:schemeClr val="dk1"/>
+          </a:fontRef>
+        </p:style>
+        <p:txBody>
+          <a:bodyPr rtlCol="0" anchor="ctr"/>
+          <a:lstStyle/>
+          <a:p>
+            <a:pPr algn="ctr"/>
+            <a:endParaRPr lang="zh-TW" altLang="en-US"/>
+          </a:p>
+        </p:txBody>
+      </p:sp>
+      <p:sp>
+        <p:nvSpPr>
+          <p:cNvPr id="46" name="圓角矩形 45"/>
+          <p:cNvSpPr/>
+          <p:nvPr/>
+        </p:nvSpPr>
+        <p:spPr>
+          <a:xfrm>
+            <a:off x="10048875" y="3775075"/>
+            <a:ext cx="533400" cy="482600"/>
+          </a:xfrm>
+          <a:prstGeom prst="roundRect">
+            <a:avLst/>
+          </a:prstGeom>
+        </p:spPr>
+        <p:style>
+          <a:lnRef idx="2">
+            <a:schemeClr val="accent6"/>
+          </a:lnRef>
+          <a:fillRef idx="1">
+            <a:schemeClr val="lt1"/>
+          </a:fillRef>
+          <a:effectRef idx="0">
+            <a:schemeClr val="accent6"/>
+          </a:effectRef>
+          <a:fontRef idx="minor">
+            <a:schemeClr val="dk1"/>
+          </a:fontRef>
+        </p:style>
+        <p:txBody>
+          <a:bodyPr rtlCol="0" anchor="ctr"/>
+          <a:lstStyle/>
+          <a:p>
+            <a:pPr algn="ctr"/>
+            <a:endParaRPr lang="zh-TW" altLang="en-US"/>
+          </a:p>
+        </p:txBody>
+      </p:sp>
+      <p:sp>
+        <p:nvSpPr>
+          <p:cNvPr id="47" name="圓角矩形 46"/>
+          <p:cNvSpPr/>
+          <p:nvPr/>
+        </p:nvSpPr>
+        <p:spPr>
+          <a:xfrm>
+            <a:off x="10766425" y="3775075"/>
+            <a:ext cx="533400" cy="482600"/>
+          </a:xfrm>
+          <a:prstGeom prst="roundRect">
+            <a:avLst/>
+          </a:prstGeom>
+        </p:spPr>
+        <p:style>
+          <a:lnRef idx="2">
+            <a:schemeClr val="accent6"/>
+          </a:lnRef>
+          <a:fillRef idx="1">
+            <a:schemeClr val="lt1"/>
+          </a:fillRef>
+          <a:effectRef idx="0">
+            <a:schemeClr val="accent6"/>
+          </a:effectRef>
+          <a:fontRef idx="minor">
+            <a:schemeClr val="dk1"/>
+          </a:fontRef>
+        </p:style>
+        <p:txBody>
+          <a:bodyPr rtlCol="0" anchor="ctr"/>
+          <a:lstStyle/>
+          <a:p>
+            <a:pPr algn="ctr"/>
+            <a:endParaRPr lang="zh-TW" altLang="en-US"/>
+          </a:p>
+        </p:txBody>
+      </p:sp>
+      <p:sp>
+        <p:nvSpPr>
+          <p:cNvPr id="48" name="圓角矩形 47"/>
+          <p:cNvSpPr/>
+          <p:nvPr/>
+        </p:nvSpPr>
+        <p:spPr>
+          <a:xfrm>
+            <a:off x="2260600" y="4379913"/>
+            <a:ext cx="533400" cy="482600"/>
+          </a:xfrm>
+          <a:prstGeom prst="roundRect">
+            <a:avLst/>
+          </a:prstGeom>
+        </p:spPr>
+        <p:style>
+          <a:lnRef idx="2">
+            <a:schemeClr val="accent6"/>
+          </a:lnRef>
+          <a:fillRef idx="1">
+            <a:schemeClr val="lt1"/>
+          </a:fillRef>
+          <a:effectRef idx="0">
+            <a:schemeClr val="accent6"/>
+          </a:effectRef>
+          <a:fontRef idx="minor">
+            <a:schemeClr val="dk1"/>
+          </a:fontRef>
+        </p:style>
+        <p:txBody>
+          <a:bodyPr rtlCol="0" anchor="ctr"/>
+          <a:lstStyle/>
+          <a:p>
+            <a:pPr algn="ctr"/>
+            <a:endParaRPr lang="zh-TW" altLang="en-US"/>
+          </a:p>
+        </p:txBody>
+      </p:sp>
+      <p:sp>
+        <p:nvSpPr>
+          <p:cNvPr id="49" name="圓角矩形 48"/>
+          <p:cNvSpPr/>
+          <p:nvPr/>
+        </p:nvSpPr>
+        <p:spPr>
+          <a:xfrm>
+            <a:off x="2946400" y="4379913"/>
+            <a:ext cx="533400" cy="482600"/>
+          </a:xfrm>
+          <a:prstGeom prst="roundRect">
+            <a:avLst/>
+          </a:prstGeom>
+        </p:spPr>
+        <p:style>
+          <a:lnRef idx="2">
+            <a:schemeClr val="accent6"/>
+          </a:lnRef>
+          <a:fillRef idx="1">
+            <a:schemeClr val="lt1"/>
+          </a:fillRef>
+          <a:effectRef idx="0">
+            <a:schemeClr val="accent6"/>
+          </a:effectRef>
+          <a:fontRef idx="minor">
+            <a:schemeClr val="dk1"/>
+          </a:fontRef>
+        </p:style>
+        <p:txBody>
+          <a:bodyPr rtlCol="0" anchor="ctr"/>
+          <a:lstStyle/>
+          <a:p>
+            <a:pPr algn="ctr"/>
+            <a:endParaRPr lang="zh-TW" altLang="en-US"/>
+          </a:p>
+        </p:txBody>
+      </p:sp>
+      <p:sp>
+        <p:nvSpPr>
+          <p:cNvPr id="50" name="圓角矩形 49"/>
+          <p:cNvSpPr/>
+          <p:nvPr/>
+        </p:nvSpPr>
+        <p:spPr>
+          <a:xfrm>
+            <a:off x="3644900" y="4379913"/>
+            <a:ext cx="533400" cy="482600"/>
+          </a:xfrm>
+          <a:prstGeom prst="roundRect">
+            <a:avLst/>
+          </a:prstGeom>
+        </p:spPr>
+        <p:style>
+          <a:lnRef idx="2">
+            <a:schemeClr val="accent6"/>
+          </a:lnRef>
+          <a:fillRef idx="1">
+            <a:schemeClr val="lt1"/>
+          </a:fillRef>
+          <a:effectRef idx="0">
+            <a:schemeClr val="accent6"/>
+          </a:effectRef>
+          <a:fontRef idx="minor">
+            <a:schemeClr val="dk1"/>
+          </a:fontRef>
+        </p:style>
+        <p:txBody>
+          <a:bodyPr rtlCol="0" anchor="ctr"/>
+          <a:lstStyle/>
+          <a:p>
+            <a:pPr algn="ctr"/>
+            <a:endParaRPr lang="zh-TW" altLang="en-US"/>
+          </a:p>
+        </p:txBody>
+      </p:sp>
+      <p:sp>
+        <p:nvSpPr>
+          <p:cNvPr id="51" name="圓角矩形 50"/>
+          <p:cNvSpPr/>
+          <p:nvPr/>
+        </p:nvSpPr>
+        <p:spPr>
+          <a:xfrm>
+            <a:off x="4362450" y="4379913"/>
+            <a:ext cx="533400" cy="482600"/>
+          </a:xfrm>
+          <a:prstGeom prst="roundRect">
+            <a:avLst/>
+          </a:prstGeom>
+        </p:spPr>
+        <p:style>
+          <a:lnRef idx="2">
+            <a:schemeClr val="accent6"/>
+          </a:lnRef>
+          <a:fillRef idx="1">
+            <a:schemeClr val="lt1"/>
+          </a:fillRef>
+          <a:effectRef idx="0">
+            <a:schemeClr val="accent6"/>
+          </a:effectRef>
+          <a:fontRef idx="minor">
+            <a:schemeClr val="dk1"/>
+          </a:fontRef>
+        </p:style>
+        <p:txBody>
+          <a:bodyPr rtlCol="0" anchor="ctr"/>
+          <a:lstStyle/>
+          <a:p>
+            <a:pPr algn="ctr"/>
+            <a:endParaRPr lang="zh-TW" altLang="en-US"/>
+          </a:p>
+        </p:txBody>
+      </p:sp>
+      <p:sp>
+        <p:nvSpPr>
+          <p:cNvPr id="52" name="圓角矩形 51"/>
+          <p:cNvSpPr/>
+          <p:nvPr/>
+        </p:nvSpPr>
+        <p:spPr>
+          <a:xfrm>
+            <a:off x="5080000" y="4379913"/>
+            <a:ext cx="533400" cy="482600"/>
+          </a:xfrm>
+          <a:prstGeom prst="roundRect">
+            <a:avLst/>
+          </a:prstGeom>
+        </p:spPr>
+        <p:style>
+          <a:lnRef idx="2">
+            <a:schemeClr val="accent6"/>
+          </a:lnRef>
+          <a:fillRef idx="1">
+            <a:schemeClr val="lt1"/>
+          </a:fillRef>
+          <a:effectRef idx="0">
+            <a:schemeClr val="accent6"/>
+          </a:effectRef>
+          <a:fontRef idx="minor">
+            <a:schemeClr val="dk1"/>
+          </a:fontRef>
+        </p:style>
+        <p:txBody>
+          <a:bodyPr rtlCol="0" anchor="ctr"/>
+          <a:lstStyle/>
+          <a:p>
+            <a:pPr algn="ctr"/>
+            <a:endParaRPr lang="zh-TW" altLang="en-US"/>
+          </a:p>
+        </p:txBody>
+      </p:sp>
+      <p:sp>
+        <p:nvSpPr>
+          <p:cNvPr id="53" name="圓角矩形 52"/>
+          <p:cNvSpPr/>
+          <p:nvPr/>
+        </p:nvSpPr>
+        <p:spPr>
+          <a:xfrm>
+            <a:off x="5797550" y="4379913"/>
+            <a:ext cx="533400" cy="482600"/>
+          </a:xfrm>
+          <a:prstGeom prst="roundRect">
+            <a:avLst/>
+          </a:prstGeom>
+        </p:spPr>
+        <p:style>
+          <a:lnRef idx="2">
+            <a:schemeClr val="accent6"/>
+          </a:lnRef>
+          <a:fillRef idx="1">
+            <a:schemeClr val="lt1"/>
+          </a:fillRef>
+          <a:effectRef idx="0">
+            <a:schemeClr val="accent6"/>
+          </a:effectRef>
+          <a:fontRef idx="minor">
+            <a:schemeClr val="dk1"/>
+          </a:fontRef>
+        </p:style>
+        <p:txBody>
+          <a:bodyPr rtlCol="0" anchor="ctr"/>
+          <a:lstStyle/>
+          <a:p>
+            <a:pPr algn="ctr"/>
+            <a:endParaRPr lang="zh-TW" altLang="en-US"/>
+          </a:p>
+        </p:txBody>
+      </p:sp>
+      <p:sp>
+        <p:nvSpPr>
+          <p:cNvPr id="54" name="圓角矩形 53"/>
+          <p:cNvSpPr/>
+          <p:nvPr/>
+        </p:nvSpPr>
+        <p:spPr>
+          <a:xfrm>
+            <a:off x="6483350" y="4379913"/>
+            <a:ext cx="533400" cy="482600"/>
+          </a:xfrm>
+          <a:prstGeom prst="roundRect">
+            <a:avLst/>
+          </a:prstGeom>
+        </p:spPr>
+        <p:style>
+          <a:lnRef idx="2">
+            <a:schemeClr val="accent6"/>
+          </a:lnRef>
+          <a:fillRef idx="1">
+            <a:schemeClr val="lt1"/>
+          </a:fillRef>
+          <a:effectRef idx="0">
+            <a:schemeClr val="accent6"/>
+          </a:effectRef>
+          <a:fontRef idx="minor">
+            <a:schemeClr val="dk1"/>
+          </a:fontRef>
+        </p:style>
+        <p:txBody>
+          <a:bodyPr rtlCol="0" anchor="ctr"/>
+          <a:lstStyle/>
+          <a:p>
+            <a:pPr algn="ctr"/>
+            <a:endParaRPr lang="zh-TW" altLang="en-US"/>
+          </a:p>
+        </p:txBody>
+      </p:sp>
+      <p:sp>
+        <p:nvSpPr>
+          <p:cNvPr id="55" name="圓角矩形 54"/>
+          <p:cNvSpPr/>
+          <p:nvPr/>
+        </p:nvSpPr>
+        <p:spPr>
+          <a:xfrm>
+            <a:off x="7181850" y="4379913"/>
+            <a:ext cx="533400" cy="482600"/>
+          </a:xfrm>
+          <a:prstGeom prst="roundRect">
+            <a:avLst/>
+          </a:prstGeom>
+        </p:spPr>
+        <p:style>
+          <a:lnRef idx="2">
+            <a:schemeClr val="accent6"/>
+          </a:lnRef>
+          <a:fillRef idx="1">
+            <a:schemeClr val="lt1"/>
+          </a:fillRef>
+          <a:effectRef idx="0">
+            <a:schemeClr val="accent6"/>
+          </a:effectRef>
+          <a:fontRef idx="minor">
+            <a:schemeClr val="dk1"/>
+          </a:fontRef>
+        </p:style>
+        <p:txBody>
+          <a:bodyPr rtlCol="0" anchor="ctr"/>
+          <a:lstStyle/>
+          <a:p>
+            <a:pPr algn="ctr"/>
+            <a:endParaRPr lang="zh-TW" altLang="en-US"/>
+          </a:p>
+        </p:txBody>
+      </p:sp>
+      <p:sp>
+        <p:nvSpPr>
+          <p:cNvPr id="56" name="圓角矩形 55"/>
+          <p:cNvSpPr/>
+          <p:nvPr/>
+        </p:nvSpPr>
+        <p:spPr>
+          <a:xfrm>
+            <a:off x="7899400" y="4379913"/>
+            <a:ext cx="533400" cy="482600"/>
+          </a:xfrm>
+          <a:prstGeom prst="roundRect">
+            <a:avLst/>
+          </a:prstGeom>
+        </p:spPr>
+        <p:style>
+          <a:lnRef idx="2">
+            <a:schemeClr val="accent6"/>
+          </a:lnRef>
+          <a:fillRef idx="1">
+            <a:schemeClr val="lt1"/>
+          </a:fillRef>
+          <a:effectRef idx="0">
+            <a:schemeClr val="accent6"/>
+          </a:effectRef>
+          <a:fontRef idx="minor">
+            <a:schemeClr val="dk1"/>
+          </a:fontRef>
+        </p:style>
+        <p:txBody>
+          <a:bodyPr rtlCol="0" anchor="ctr"/>
+          <a:lstStyle/>
+          <a:p>
+            <a:pPr algn="ctr"/>
+            <a:endParaRPr lang="zh-TW" altLang="en-US"/>
+          </a:p>
+        </p:txBody>
+      </p:sp>
+      <p:sp>
+        <p:nvSpPr>
+          <p:cNvPr id="57" name="圓角矩形 56"/>
+          <p:cNvSpPr/>
+          <p:nvPr/>
+        </p:nvSpPr>
+        <p:spPr>
+          <a:xfrm>
+            <a:off x="8616950" y="4379913"/>
+            <a:ext cx="533400" cy="482600"/>
+          </a:xfrm>
+          <a:prstGeom prst="roundRect">
+            <a:avLst/>
+          </a:prstGeom>
+        </p:spPr>
+        <p:style>
+          <a:lnRef idx="2">
+            <a:schemeClr val="accent6"/>
+          </a:lnRef>
+          <a:fillRef idx="1">
+            <a:schemeClr val="lt1"/>
+          </a:fillRef>
+          <a:effectRef idx="0">
+            <a:schemeClr val="accent6"/>
+          </a:effectRef>
+          <a:fontRef idx="minor">
+            <a:schemeClr val="dk1"/>
+          </a:fontRef>
+        </p:style>
+        <p:txBody>
+          <a:bodyPr rtlCol="0" anchor="ctr"/>
+          <a:lstStyle/>
+          <a:p>
+            <a:pPr algn="ctr"/>
+            <a:endParaRPr lang="zh-TW" altLang="en-US"/>
+          </a:p>
+        </p:txBody>
+      </p:sp>
+      <p:sp>
+        <p:nvSpPr>
+          <p:cNvPr id="58" name="圓角矩形 57"/>
+          <p:cNvSpPr/>
+          <p:nvPr/>
+        </p:nvSpPr>
+        <p:spPr>
+          <a:xfrm>
+            <a:off x="9331325" y="4379913"/>
+            <a:ext cx="533400" cy="482600"/>
+          </a:xfrm>
+          <a:prstGeom prst="roundRect">
+            <a:avLst/>
+          </a:prstGeom>
+        </p:spPr>
+        <p:style>
+          <a:lnRef idx="2">
+            <a:schemeClr val="accent6"/>
+          </a:lnRef>
+          <a:fillRef idx="1">
+            <a:schemeClr val="lt1"/>
+          </a:fillRef>
+          <a:effectRef idx="0">
+            <a:schemeClr val="accent6"/>
+          </a:effectRef>
+          <a:fontRef idx="minor">
+            <a:schemeClr val="dk1"/>
+          </a:fontRef>
+        </p:style>
+        <p:txBody>
+          <a:bodyPr rtlCol="0" anchor="ctr"/>
+          <a:lstStyle/>
+          <a:p>
+            <a:pPr algn="ctr"/>
+            <a:endParaRPr lang="zh-TW" altLang="en-US"/>
+          </a:p>
+        </p:txBody>
+      </p:sp>
+      <p:sp>
+        <p:nvSpPr>
+          <p:cNvPr id="59" name="圓角矩形 58"/>
+          <p:cNvSpPr/>
+          <p:nvPr/>
+        </p:nvSpPr>
+        <p:spPr>
+          <a:xfrm>
+            <a:off x="10048875" y="4379913"/>
+            <a:ext cx="533400" cy="482600"/>
+          </a:xfrm>
+          <a:prstGeom prst="roundRect">
+            <a:avLst/>
+          </a:prstGeom>
+        </p:spPr>
+        <p:style>
+          <a:lnRef idx="2">
+            <a:schemeClr val="accent6"/>
+          </a:lnRef>
+          <a:fillRef idx="1">
+            <a:schemeClr val="lt1"/>
+          </a:fillRef>
+          <a:effectRef idx="0">
+            <a:schemeClr val="accent6"/>
+          </a:effectRef>
+          <a:fontRef idx="minor">
+            <a:schemeClr val="dk1"/>
+          </a:fontRef>
+        </p:style>
+        <p:txBody>
+          <a:bodyPr rtlCol="0" anchor="ctr"/>
+          <a:lstStyle/>
+          <a:p>
+            <a:pPr algn="ctr"/>
+            <a:endParaRPr lang="zh-TW" altLang="en-US"/>
+          </a:p>
+        </p:txBody>
+      </p:sp>
+      <p:sp>
+        <p:nvSpPr>
+          <p:cNvPr id="60" name="圓角矩形 59"/>
+          <p:cNvSpPr/>
+          <p:nvPr/>
+        </p:nvSpPr>
+        <p:spPr>
+          <a:xfrm>
+            <a:off x="10766425" y="4379913"/>
+            <a:ext cx="533400" cy="482600"/>
+          </a:xfrm>
+          <a:prstGeom prst="roundRect">
+            <a:avLst/>
+          </a:prstGeom>
+        </p:spPr>
+        <p:style>
+          <a:lnRef idx="2">
+            <a:schemeClr val="accent6"/>
+          </a:lnRef>
+          <a:fillRef idx="1">
+            <a:schemeClr val="lt1"/>
+          </a:fillRef>
+          <a:effectRef idx="0">
+            <a:schemeClr val="accent6"/>
+          </a:effectRef>
+          <a:fontRef idx="minor">
+            <a:schemeClr val="dk1"/>
+          </a:fontRef>
+        </p:style>
+        <p:txBody>
+          <a:bodyPr rtlCol="0" anchor="ctr"/>
+          <a:lstStyle/>
+          <a:p>
+            <a:pPr algn="ctr"/>
+            <a:endParaRPr lang="zh-TW" altLang="en-US"/>
+          </a:p>
+        </p:txBody>
+      </p:sp>
+    </p:spTree>
+    <p:extLst>
+      <p:ext uri="{BB962C8B-B14F-4D97-AF65-F5344CB8AC3E}">
+        <p14:creationId xmlns:p14="http://schemas.microsoft.com/office/powerpoint/2010/main" val="1614679703"/>
+      </p:ext>
+    </p:extLst>
+  </p:cSld>
+  <p:clrMapOvr>
+    <a:masterClrMapping/>
+  </p:clrMapOvr>
+  <p:timing>
+    <p:tnLst>
+      <p:par>
+        <p:cTn id="1" dur="indefinite" restart="never" nodeType="tmRoot"/>
+      </p:par>
+    </p:tnLst>
+  </p:timing>
+</p:sld>
+</file>
+
 <file path=ppt/theme/theme1.xml><?xml version="1.0" encoding="utf-8"?>
 <a:theme xmlns:a="http://schemas.openxmlformats.org/drawingml/2006/main" name="Office 佈景主題">
   <a:themeElements>

</xml_diff>

<commit_message>
draft: Azure Labs: Mixed-OS Docker Swarm
</commit_message>
<xml_diff>
--- a/wp-content/uploads/2017/05/slides.pptx
+++ b/wp-content/uploads/2017/05/slides.pptx
@@ -7,6 +7,7 @@
   <p:sldIdLst>
     <p:sldId id="256" r:id="rId2"/>
     <p:sldId id="257" r:id="rId3"/>
+    <p:sldId id="258" r:id="rId4"/>
   </p:sldIdLst>
   <p:sldSz cx="12192000" cy="6858000"/>
   <p:notesSz cx="6858000" cy="9144000"/>
@@ -244,7 +245,7 @@
           <a:p>
             <a:fld id="{AB2CABD1-DD9B-46C9-AF9D-45F2D6A20CB2}" type="datetimeFigureOut">
               <a:rPr lang="zh-TW" altLang="en-US" smtClean="0"/>
-              <a:t>2017/6/20</a:t>
+              <a:t>2017/7/30</a:t>
             </a:fld>
             <a:endParaRPr lang="zh-TW" altLang="en-US"/>
           </a:p>
@@ -414,7 +415,7 @@
           <a:p>
             <a:fld id="{AB2CABD1-DD9B-46C9-AF9D-45F2D6A20CB2}" type="datetimeFigureOut">
               <a:rPr lang="zh-TW" altLang="en-US" smtClean="0"/>
-              <a:t>2017/6/20</a:t>
+              <a:t>2017/7/30</a:t>
             </a:fld>
             <a:endParaRPr lang="zh-TW" altLang="en-US"/>
           </a:p>
@@ -594,7 +595,7 @@
           <a:p>
             <a:fld id="{AB2CABD1-DD9B-46C9-AF9D-45F2D6A20CB2}" type="datetimeFigureOut">
               <a:rPr lang="zh-TW" altLang="en-US" smtClean="0"/>
-              <a:t>2017/6/20</a:t>
+              <a:t>2017/7/30</a:t>
             </a:fld>
             <a:endParaRPr lang="zh-TW" altLang="en-US"/>
           </a:p>
@@ -764,7 +765,7 @@
           <a:p>
             <a:fld id="{AB2CABD1-DD9B-46C9-AF9D-45F2D6A20CB2}" type="datetimeFigureOut">
               <a:rPr lang="zh-TW" altLang="en-US" smtClean="0"/>
-              <a:t>2017/6/20</a:t>
+              <a:t>2017/7/30</a:t>
             </a:fld>
             <a:endParaRPr lang="zh-TW" altLang="en-US"/>
           </a:p>
@@ -1010,7 +1011,7 @@
           <a:p>
             <a:fld id="{AB2CABD1-DD9B-46C9-AF9D-45F2D6A20CB2}" type="datetimeFigureOut">
               <a:rPr lang="zh-TW" altLang="en-US" smtClean="0"/>
-              <a:t>2017/6/20</a:t>
+              <a:t>2017/7/30</a:t>
             </a:fld>
             <a:endParaRPr lang="zh-TW" altLang="en-US"/>
           </a:p>
@@ -1242,7 +1243,7 @@
           <a:p>
             <a:fld id="{AB2CABD1-DD9B-46C9-AF9D-45F2D6A20CB2}" type="datetimeFigureOut">
               <a:rPr lang="zh-TW" altLang="en-US" smtClean="0"/>
-              <a:t>2017/6/20</a:t>
+              <a:t>2017/7/30</a:t>
             </a:fld>
             <a:endParaRPr lang="zh-TW" altLang="en-US"/>
           </a:p>
@@ -1609,7 +1610,7 @@
           <a:p>
             <a:fld id="{AB2CABD1-DD9B-46C9-AF9D-45F2D6A20CB2}" type="datetimeFigureOut">
               <a:rPr lang="zh-TW" altLang="en-US" smtClean="0"/>
-              <a:t>2017/6/20</a:t>
+              <a:t>2017/7/30</a:t>
             </a:fld>
             <a:endParaRPr lang="zh-TW" altLang="en-US"/>
           </a:p>
@@ -1727,7 +1728,7 @@
           <a:p>
             <a:fld id="{AB2CABD1-DD9B-46C9-AF9D-45F2D6A20CB2}" type="datetimeFigureOut">
               <a:rPr lang="zh-TW" altLang="en-US" smtClean="0"/>
-              <a:t>2017/6/20</a:t>
+              <a:t>2017/7/30</a:t>
             </a:fld>
             <a:endParaRPr lang="zh-TW" altLang="en-US"/>
           </a:p>
@@ -1822,7 +1823,7 @@
           <a:p>
             <a:fld id="{AB2CABD1-DD9B-46C9-AF9D-45F2D6A20CB2}" type="datetimeFigureOut">
               <a:rPr lang="zh-TW" altLang="en-US" smtClean="0"/>
-              <a:t>2017/6/20</a:t>
+              <a:t>2017/7/30</a:t>
             </a:fld>
             <a:endParaRPr lang="zh-TW" altLang="en-US"/>
           </a:p>
@@ -2099,7 +2100,7 @@
           <a:p>
             <a:fld id="{AB2CABD1-DD9B-46C9-AF9D-45F2D6A20CB2}" type="datetimeFigureOut">
               <a:rPr lang="zh-TW" altLang="en-US" smtClean="0"/>
-              <a:t>2017/6/20</a:t>
+              <a:t>2017/7/30</a:t>
             </a:fld>
             <a:endParaRPr lang="zh-TW" altLang="en-US"/>
           </a:p>
@@ -2352,7 +2353,7 @@
           <a:p>
             <a:fld id="{AB2CABD1-DD9B-46C9-AF9D-45F2D6A20CB2}" type="datetimeFigureOut">
               <a:rPr lang="zh-TW" altLang="en-US" smtClean="0"/>
-              <a:t>2017/6/20</a:t>
+              <a:t>2017/7/30</a:t>
             </a:fld>
             <a:endParaRPr lang="zh-TW" altLang="en-US"/>
           </a:p>
@@ -2565,7 +2566,7 @@
           <a:p>
             <a:fld id="{AB2CABD1-DD9B-46C9-AF9D-45F2D6A20CB2}" type="datetimeFigureOut">
               <a:rPr lang="zh-TW" altLang="en-US" smtClean="0"/>
-              <a:t>2017/6/20</a:t>
+              <a:t>2017/7/30</a:t>
             </a:fld>
             <a:endParaRPr lang="zh-TW" altLang="en-US"/>
           </a:p>
@@ -5639,6 +5640,1061 @@
 </p:sld>
 </file>
 
+<file path=ppt/slides/slide3.xml><?xml version="1.0" encoding="utf-8"?>
+<p:sld xmlns:a="http://schemas.openxmlformats.org/drawingml/2006/main" xmlns:r="http://schemas.openxmlformats.org/officeDocument/2006/relationships" xmlns:p="http://schemas.openxmlformats.org/presentationml/2006/main">
+  <p:cSld>
+    <p:spTree>
+      <p:nvGrpSpPr>
+        <p:cNvPr id="1" name=""/>
+        <p:cNvGrpSpPr/>
+        <p:nvPr/>
+      </p:nvGrpSpPr>
+      <p:grpSpPr>
+        <a:xfrm>
+          <a:off x="0" y="0"/>
+          <a:ext cx="0" cy="0"/>
+          <a:chOff x="0" y="0"/>
+          <a:chExt cx="0" cy="0"/>
+        </a:xfrm>
+      </p:grpSpPr>
+      <p:sp>
+        <p:nvSpPr>
+          <p:cNvPr id="4" name="圓角矩形 3"/>
+          <p:cNvSpPr/>
+          <p:nvPr/>
+        </p:nvSpPr>
+        <p:spPr>
+          <a:xfrm>
+            <a:off x="698500" y="647700"/>
+            <a:ext cx="2565400" cy="3632200"/>
+          </a:xfrm>
+          <a:prstGeom prst="roundRect">
+            <a:avLst/>
+          </a:prstGeom>
+        </p:spPr>
+        <p:style>
+          <a:lnRef idx="2">
+            <a:schemeClr val="dk1"/>
+          </a:lnRef>
+          <a:fillRef idx="1">
+            <a:schemeClr val="lt1"/>
+          </a:fillRef>
+          <a:effectRef idx="0">
+            <a:schemeClr val="dk1"/>
+          </a:effectRef>
+          <a:fontRef idx="minor">
+            <a:schemeClr val="dk1"/>
+          </a:fontRef>
+        </p:style>
+        <p:txBody>
+          <a:bodyPr rtlCol="0" anchor="ctr"/>
+          <a:lstStyle/>
+          <a:p>
+            <a:endParaRPr lang="en-US" altLang="zh-TW" dirty="0" smtClean="0"/>
+          </a:p>
+          <a:p>
+            <a:endParaRPr lang="en-US" altLang="zh-TW" dirty="0"/>
+          </a:p>
+          <a:p>
+            <a:endParaRPr lang="en-US" altLang="zh-TW" dirty="0" smtClean="0"/>
+          </a:p>
+          <a:p>
+            <a:endParaRPr lang="en-US" altLang="zh-TW" dirty="0"/>
+          </a:p>
+          <a:p>
+            <a:endParaRPr lang="en-US" altLang="zh-TW" dirty="0" smtClean="0"/>
+          </a:p>
+          <a:p>
+            <a:endParaRPr lang="en-US" altLang="zh-TW" dirty="0"/>
+          </a:p>
+          <a:p>
+            <a:endParaRPr lang="en-US" altLang="zh-TW" dirty="0" smtClean="0"/>
+          </a:p>
+          <a:p>
+            <a:endParaRPr lang="en-US" altLang="zh-TW" dirty="0"/>
+          </a:p>
+          <a:p>
+            <a:endParaRPr lang="en-US" altLang="zh-TW" dirty="0" smtClean="0"/>
+          </a:p>
+          <a:p>
+            <a:endParaRPr lang="en-US" altLang="zh-TW" dirty="0"/>
+          </a:p>
+          <a:p>
+            <a:endParaRPr lang="en-US" altLang="zh-TW" dirty="0" smtClean="0"/>
+          </a:p>
+          <a:p>
+            <a:r>
+              <a:rPr lang="en-US" altLang="zh-TW" dirty="0" smtClean="0"/>
+              <a:t>WCS1</a:t>
+            </a:r>
+            <a:endParaRPr lang="zh-TW" altLang="en-US" dirty="0"/>
+          </a:p>
+        </p:txBody>
+      </p:sp>
+      <p:sp>
+        <p:nvSpPr>
+          <p:cNvPr id="5" name="圓角矩形 4"/>
+          <p:cNvSpPr/>
+          <p:nvPr/>
+        </p:nvSpPr>
+        <p:spPr>
+          <a:xfrm>
+            <a:off x="3454400" y="647700"/>
+            <a:ext cx="2565400" cy="3632200"/>
+          </a:xfrm>
+          <a:prstGeom prst="roundRect">
+            <a:avLst/>
+          </a:prstGeom>
+        </p:spPr>
+        <p:style>
+          <a:lnRef idx="2">
+            <a:schemeClr val="dk1"/>
+          </a:lnRef>
+          <a:fillRef idx="1">
+            <a:schemeClr val="lt1"/>
+          </a:fillRef>
+          <a:effectRef idx="0">
+            <a:schemeClr val="dk1"/>
+          </a:effectRef>
+          <a:fontRef idx="minor">
+            <a:schemeClr val="dk1"/>
+          </a:fontRef>
+        </p:style>
+        <p:txBody>
+          <a:bodyPr rtlCol="0" anchor="ctr"/>
+          <a:lstStyle/>
+          <a:p>
+            <a:endParaRPr lang="en-US" altLang="zh-TW" dirty="0" smtClean="0"/>
+          </a:p>
+          <a:p>
+            <a:endParaRPr lang="en-US" altLang="zh-TW" dirty="0"/>
+          </a:p>
+          <a:p>
+            <a:endParaRPr lang="en-US" altLang="zh-TW" dirty="0" smtClean="0"/>
+          </a:p>
+          <a:p>
+            <a:endParaRPr lang="en-US" altLang="zh-TW" dirty="0"/>
+          </a:p>
+          <a:p>
+            <a:endParaRPr lang="en-US" altLang="zh-TW" dirty="0" smtClean="0"/>
+          </a:p>
+          <a:p>
+            <a:endParaRPr lang="en-US" altLang="zh-TW" dirty="0"/>
+          </a:p>
+          <a:p>
+            <a:endParaRPr lang="en-US" altLang="zh-TW" dirty="0" smtClean="0"/>
+          </a:p>
+          <a:p>
+            <a:endParaRPr lang="en-US" altLang="zh-TW" dirty="0"/>
+          </a:p>
+          <a:p>
+            <a:endParaRPr lang="en-US" altLang="zh-TW" dirty="0" smtClean="0"/>
+          </a:p>
+          <a:p>
+            <a:endParaRPr lang="en-US" altLang="zh-TW" dirty="0"/>
+          </a:p>
+          <a:p>
+            <a:endParaRPr lang="en-US" altLang="zh-TW" dirty="0" smtClean="0"/>
+          </a:p>
+          <a:p>
+            <a:r>
+              <a:rPr lang="en-US" altLang="zh-TW" dirty="0" smtClean="0"/>
+              <a:t>WCS2</a:t>
+            </a:r>
+            <a:endParaRPr lang="zh-TW" altLang="en-US" dirty="0"/>
+          </a:p>
+        </p:txBody>
+      </p:sp>
+      <p:sp>
+        <p:nvSpPr>
+          <p:cNvPr id="6" name="圓角矩形 5"/>
+          <p:cNvSpPr/>
+          <p:nvPr/>
+        </p:nvSpPr>
+        <p:spPr>
+          <a:xfrm>
+            <a:off x="6210300" y="647700"/>
+            <a:ext cx="2565400" cy="3632200"/>
+          </a:xfrm>
+          <a:prstGeom prst="roundRect">
+            <a:avLst/>
+          </a:prstGeom>
+        </p:spPr>
+        <p:style>
+          <a:lnRef idx="2">
+            <a:schemeClr val="dk1"/>
+          </a:lnRef>
+          <a:fillRef idx="1">
+            <a:schemeClr val="lt1"/>
+          </a:fillRef>
+          <a:effectRef idx="0">
+            <a:schemeClr val="dk1"/>
+          </a:effectRef>
+          <a:fontRef idx="minor">
+            <a:schemeClr val="dk1"/>
+          </a:fontRef>
+        </p:style>
+        <p:txBody>
+          <a:bodyPr rtlCol="0" anchor="ctr"/>
+          <a:lstStyle/>
+          <a:p>
+            <a:endParaRPr lang="en-US" altLang="zh-TW" dirty="0" smtClean="0"/>
+          </a:p>
+          <a:p>
+            <a:endParaRPr lang="en-US" altLang="zh-TW" dirty="0"/>
+          </a:p>
+          <a:p>
+            <a:endParaRPr lang="en-US" altLang="zh-TW" dirty="0" smtClean="0"/>
+          </a:p>
+          <a:p>
+            <a:endParaRPr lang="en-US" altLang="zh-TW" dirty="0"/>
+          </a:p>
+          <a:p>
+            <a:endParaRPr lang="en-US" altLang="zh-TW" dirty="0" smtClean="0"/>
+          </a:p>
+          <a:p>
+            <a:endParaRPr lang="en-US" altLang="zh-TW" dirty="0"/>
+          </a:p>
+          <a:p>
+            <a:endParaRPr lang="en-US" altLang="zh-TW" dirty="0" smtClean="0"/>
+          </a:p>
+          <a:p>
+            <a:endParaRPr lang="en-US" altLang="zh-TW" dirty="0"/>
+          </a:p>
+          <a:p>
+            <a:endParaRPr lang="en-US" altLang="zh-TW" dirty="0" smtClean="0"/>
+          </a:p>
+          <a:p>
+            <a:endParaRPr lang="en-US" altLang="zh-TW" dirty="0"/>
+          </a:p>
+          <a:p>
+            <a:endParaRPr lang="en-US" altLang="zh-TW" dirty="0" smtClean="0"/>
+          </a:p>
+          <a:p>
+            <a:r>
+              <a:rPr lang="en-US" altLang="zh-TW" dirty="0" smtClean="0"/>
+              <a:t>WCS3</a:t>
+            </a:r>
+            <a:endParaRPr lang="zh-TW" altLang="en-US" dirty="0"/>
+          </a:p>
+        </p:txBody>
+      </p:sp>
+      <p:pic>
+        <p:nvPicPr>
+          <p:cNvPr id="1026" name="Picture 2" descr="「windows」的圖片搜尋結果"/>
+          <p:cNvPicPr>
+            <a:picLocks noChangeAspect="1" noChangeArrowheads="1"/>
+          </p:cNvPicPr>
+          <p:nvPr/>
+        </p:nvPicPr>
+        <p:blipFill>
+          <a:blip r:embed="rId2" cstate="print">
+            <a:extLst>
+              <a:ext uri="{28A0092B-C50C-407E-A947-70E740481C1C}">
+                <a14:useLocalDpi xmlns:a14="http://schemas.microsoft.com/office/drawing/2010/main" val="0"/>
+              </a:ext>
+            </a:extLst>
+          </a:blip>
+          <a:srcRect/>
+          <a:stretch>
+            <a:fillRect/>
+          </a:stretch>
+        </p:blipFill>
+        <p:spPr bwMode="auto">
+          <a:xfrm>
+            <a:off x="698500" y="2997200"/>
+            <a:ext cx="1016000" cy="1016000"/>
+          </a:xfrm>
+          <a:prstGeom prst="rect">
+            <a:avLst/>
+          </a:prstGeom>
+          <a:noFill/>
+          <a:extLst>
+            <a:ext uri="{909E8E84-426E-40DD-AFC4-6F175D3DCCD1}">
+              <a14:hiddenFill xmlns:a14="http://schemas.microsoft.com/office/drawing/2010/main">
+                <a:solidFill>
+                  <a:srgbClr val="FFFFFF"/>
+                </a:solidFill>
+              </a14:hiddenFill>
+            </a:ext>
+          </a:extLst>
+        </p:spPr>
+      </p:pic>
+      <p:pic>
+        <p:nvPicPr>
+          <p:cNvPr id="8" name="Picture 2" descr="「windows」的圖片搜尋結果"/>
+          <p:cNvPicPr>
+            <a:picLocks noChangeAspect="1" noChangeArrowheads="1"/>
+          </p:cNvPicPr>
+          <p:nvPr/>
+        </p:nvPicPr>
+        <p:blipFill>
+          <a:blip r:embed="rId2" cstate="print">
+            <a:extLst>
+              <a:ext uri="{28A0092B-C50C-407E-A947-70E740481C1C}">
+                <a14:useLocalDpi xmlns:a14="http://schemas.microsoft.com/office/drawing/2010/main" val="0"/>
+              </a:ext>
+            </a:extLst>
+          </a:blip>
+          <a:srcRect/>
+          <a:stretch>
+            <a:fillRect/>
+          </a:stretch>
+        </p:blipFill>
+        <p:spPr bwMode="auto">
+          <a:xfrm>
+            <a:off x="3454400" y="2997200"/>
+            <a:ext cx="1016000" cy="1016000"/>
+          </a:xfrm>
+          <a:prstGeom prst="rect">
+            <a:avLst/>
+          </a:prstGeom>
+          <a:noFill/>
+          <a:extLst>
+            <a:ext uri="{909E8E84-426E-40DD-AFC4-6F175D3DCCD1}">
+              <a14:hiddenFill xmlns:a14="http://schemas.microsoft.com/office/drawing/2010/main">
+                <a:solidFill>
+                  <a:srgbClr val="FFFFFF"/>
+                </a:solidFill>
+              </a14:hiddenFill>
+            </a:ext>
+          </a:extLst>
+        </p:spPr>
+      </p:pic>
+      <p:pic>
+        <p:nvPicPr>
+          <p:cNvPr id="9" name="Picture 2" descr="「windows」的圖片搜尋結果"/>
+          <p:cNvPicPr>
+            <a:picLocks noChangeAspect="1" noChangeArrowheads="1"/>
+          </p:cNvPicPr>
+          <p:nvPr/>
+        </p:nvPicPr>
+        <p:blipFill>
+          <a:blip r:embed="rId2" cstate="print">
+            <a:extLst>
+              <a:ext uri="{28A0092B-C50C-407E-A947-70E740481C1C}">
+                <a14:useLocalDpi xmlns:a14="http://schemas.microsoft.com/office/drawing/2010/main" val="0"/>
+              </a:ext>
+            </a:extLst>
+          </a:blip>
+          <a:srcRect/>
+          <a:stretch>
+            <a:fillRect/>
+          </a:stretch>
+        </p:blipFill>
+        <p:spPr bwMode="auto">
+          <a:xfrm>
+            <a:off x="6210300" y="2997200"/>
+            <a:ext cx="1016000" cy="1016000"/>
+          </a:xfrm>
+          <a:prstGeom prst="rect">
+            <a:avLst/>
+          </a:prstGeom>
+          <a:noFill/>
+          <a:extLst>
+            <a:ext uri="{909E8E84-426E-40DD-AFC4-6F175D3DCCD1}">
+              <a14:hiddenFill xmlns:a14="http://schemas.microsoft.com/office/drawing/2010/main">
+                <a:solidFill>
+                  <a:srgbClr val="FFFFFF"/>
+                </a:solidFill>
+              </a14:hiddenFill>
+            </a:ext>
+          </a:extLst>
+        </p:spPr>
+      </p:pic>
+      <p:sp>
+        <p:nvSpPr>
+          <p:cNvPr id="7" name="矩形 6"/>
+          <p:cNvSpPr/>
+          <p:nvPr/>
+        </p:nvSpPr>
+        <p:spPr>
+          <a:xfrm>
+            <a:off x="596900" y="4597400"/>
+            <a:ext cx="11201400" cy="317500"/>
+          </a:xfrm>
+          <a:prstGeom prst="rect">
+            <a:avLst/>
+          </a:prstGeom>
+        </p:spPr>
+        <p:style>
+          <a:lnRef idx="0">
+            <a:schemeClr val="accent6"/>
+          </a:lnRef>
+          <a:fillRef idx="3">
+            <a:schemeClr val="accent6"/>
+          </a:fillRef>
+          <a:effectRef idx="3">
+            <a:schemeClr val="accent6"/>
+          </a:effectRef>
+          <a:fontRef idx="minor">
+            <a:schemeClr val="lt1"/>
+          </a:fontRef>
+        </p:style>
+        <p:txBody>
+          <a:bodyPr rtlCol="0" anchor="ctr"/>
+          <a:lstStyle/>
+          <a:p>
+            <a:pPr algn="ctr"/>
+            <a:r>
+              <a:rPr lang="en-US" altLang="zh-TW" dirty="0" smtClean="0"/>
+              <a:t>Network: Ingress</a:t>
+            </a:r>
+            <a:endParaRPr lang="zh-TW" altLang="en-US" dirty="0"/>
+          </a:p>
+        </p:txBody>
+      </p:sp>
+      <p:sp>
+        <p:nvSpPr>
+          <p:cNvPr id="11" name="圓角矩形 10"/>
+          <p:cNvSpPr/>
+          <p:nvPr/>
+        </p:nvSpPr>
+        <p:spPr>
+          <a:xfrm>
+            <a:off x="8966200" y="635754"/>
+            <a:ext cx="2565400" cy="3632200"/>
+          </a:xfrm>
+          <a:prstGeom prst="roundRect">
+            <a:avLst/>
+          </a:prstGeom>
+        </p:spPr>
+        <p:style>
+          <a:lnRef idx="2">
+            <a:schemeClr val="dk1"/>
+          </a:lnRef>
+          <a:fillRef idx="1">
+            <a:schemeClr val="lt1"/>
+          </a:fillRef>
+          <a:effectRef idx="0">
+            <a:schemeClr val="dk1"/>
+          </a:effectRef>
+          <a:fontRef idx="minor">
+            <a:schemeClr val="dk1"/>
+          </a:fontRef>
+        </p:style>
+        <p:txBody>
+          <a:bodyPr rtlCol="0" anchor="ctr"/>
+          <a:lstStyle/>
+          <a:p>
+            <a:endParaRPr lang="en-US" altLang="zh-TW" dirty="0" smtClean="0"/>
+          </a:p>
+          <a:p>
+            <a:endParaRPr lang="en-US" altLang="zh-TW" dirty="0"/>
+          </a:p>
+          <a:p>
+            <a:endParaRPr lang="en-US" altLang="zh-TW" dirty="0" smtClean="0"/>
+          </a:p>
+          <a:p>
+            <a:endParaRPr lang="en-US" altLang="zh-TW" dirty="0"/>
+          </a:p>
+          <a:p>
+            <a:endParaRPr lang="en-US" altLang="zh-TW" dirty="0" smtClean="0"/>
+          </a:p>
+          <a:p>
+            <a:endParaRPr lang="en-US" altLang="zh-TW" dirty="0"/>
+          </a:p>
+          <a:p>
+            <a:endParaRPr lang="en-US" altLang="zh-TW" dirty="0" smtClean="0"/>
+          </a:p>
+          <a:p>
+            <a:endParaRPr lang="en-US" altLang="zh-TW" dirty="0"/>
+          </a:p>
+          <a:p>
+            <a:endParaRPr lang="en-US" altLang="zh-TW" dirty="0" smtClean="0"/>
+          </a:p>
+          <a:p>
+            <a:endParaRPr lang="en-US" altLang="zh-TW" dirty="0"/>
+          </a:p>
+          <a:p>
+            <a:endParaRPr lang="en-US" altLang="zh-TW" dirty="0" smtClean="0"/>
+          </a:p>
+          <a:p>
+            <a:r>
+              <a:rPr lang="en-US" altLang="zh-TW" dirty="0" smtClean="0"/>
+              <a:t>LCS4</a:t>
+            </a:r>
+            <a:endParaRPr lang="zh-TW" altLang="en-US" dirty="0"/>
+          </a:p>
+        </p:txBody>
+      </p:sp>
+      <p:pic>
+        <p:nvPicPr>
+          <p:cNvPr id="1028" name="Picture 4" descr="「linux」的圖片搜尋結果"/>
+          <p:cNvPicPr>
+            <a:picLocks noChangeAspect="1" noChangeArrowheads="1"/>
+          </p:cNvPicPr>
+          <p:nvPr/>
+        </p:nvPicPr>
+        <p:blipFill>
+          <a:blip r:embed="rId3" cstate="print">
+            <a:extLst>
+              <a:ext uri="{28A0092B-C50C-407E-A947-70E740481C1C}">
+                <a14:useLocalDpi xmlns:a14="http://schemas.microsoft.com/office/drawing/2010/main" val="0"/>
+              </a:ext>
+            </a:extLst>
+          </a:blip>
+          <a:srcRect/>
+          <a:stretch>
+            <a:fillRect/>
+          </a:stretch>
+        </p:blipFill>
+        <p:spPr bwMode="auto">
+          <a:xfrm>
+            <a:off x="9129249" y="2922509"/>
+            <a:ext cx="842301" cy="1010761"/>
+          </a:xfrm>
+          <a:prstGeom prst="rect">
+            <a:avLst/>
+          </a:prstGeom>
+          <a:noFill/>
+          <a:extLst>
+            <a:ext uri="{909E8E84-426E-40DD-AFC4-6F175D3DCCD1}">
+              <a14:hiddenFill xmlns:a14="http://schemas.microsoft.com/office/drawing/2010/main">
+                <a:solidFill>
+                  <a:srgbClr val="FFFFFF"/>
+                </a:solidFill>
+              </a14:hiddenFill>
+            </a:ext>
+          </a:extLst>
+        </p:spPr>
+      </p:pic>
+      <p:sp>
+        <p:nvSpPr>
+          <p:cNvPr id="10" name="矩形 9"/>
+          <p:cNvSpPr/>
+          <p:nvPr/>
+        </p:nvSpPr>
+        <p:spPr>
+          <a:xfrm>
+            <a:off x="825500" y="1030209"/>
+            <a:ext cx="10528300" cy="838200"/>
+          </a:xfrm>
+          <a:prstGeom prst="rect">
+            <a:avLst/>
+          </a:prstGeom>
+          <a:noFill/>
+          <a:ln>
+            <a:prstDash val="dash"/>
+          </a:ln>
+        </p:spPr>
+        <p:style>
+          <a:lnRef idx="2">
+            <a:schemeClr val="accent1"/>
+          </a:lnRef>
+          <a:fillRef idx="1">
+            <a:schemeClr val="lt1"/>
+          </a:fillRef>
+          <a:effectRef idx="0">
+            <a:schemeClr val="accent1"/>
+          </a:effectRef>
+          <a:fontRef idx="minor">
+            <a:schemeClr val="dk1"/>
+          </a:fontRef>
+        </p:style>
+        <p:txBody>
+          <a:bodyPr rtlCol="0" anchor="ctr"/>
+          <a:lstStyle/>
+          <a:p>
+            <a:endParaRPr lang="en-US" altLang="zh-TW" dirty="0" smtClean="0"/>
+          </a:p>
+          <a:p>
+            <a:endParaRPr lang="en-US" altLang="zh-TW" dirty="0"/>
+          </a:p>
+          <a:p>
+            <a:r>
+              <a:rPr lang="en-US" altLang="zh-TW" dirty="0" smtClean="0"/>
+              <a:t>Service: MVCDEMO</a:t>
+            </a:r>
+            <a:endParaRPr lang="zh-TW" altLang="en-US" dirty="0"/>
+          </a:p>
+        </p:txBody>
+      </p:sp>
+      <p:sp>
+        <p:nvSpPr>
+          <p:cNvPr id="15" name="矩形 14"/>
+          <p:cNvSpPr/>
+          <p:nvPr/>
+        </p:nvSpPr>
+        <p:spPr>
+          <a:xfrm>
+            <a:off x="825500" y="1994654"/>
+            <a:ext cx="10528300" cy="838200"/>
+          </a:xfrm>
+          <a:prstGeom prst="rect">
+            <a:avLst/>
+          </a:prstGeom>
+          <a:noFill/>
+          <a:ln>
+            <a:prstDash val="dash"/>
+          </a:ln>
+        </p:spPr>
+        <p:style>
+          <a:lnRef idx="2">
+            <a:schemeClr val="accent1"/>
+          </a:lnRef>
+          <a:fillRef idx="1">
+            <a:schemeClr val="lt1"/>
+          </a:fillRef>
+          <a:effectRef idx="0">
+            <a:schemeClr val="accent1"/>
+          </a:effectRef>
+          <a:fontRef idx="minor">
+            <a:schemeClr val="dk1"/>
+          </a:fontRef>
+        </p:style>
+        <p:txBody>
+          <a:bodyPr rtlCol="0" anchor="ctr"/>
+          <a:lstStyle/>
+          <a:p>
+            <a:pPr algn="r"/>
+            <a:endParaRPr lang="en-US" altLang="zh-TW" dirty="0" smtClean="0"/>
+          </a:p>
+          <a:p>
+            <a:pPr algn="r"/>
+            <a:endParaRPr lang="en-US" altLang="zh-TW" dirty="0"/>
+          </a:p>
+          <a:p>
+            <a:r>
+              <a:rPr lang="en-US" altLang="zh-TW" dirty="0" smtClean="0"/>
+              <a:t>Service: NGINX</a:t>
+            </a:r>
+            <a:endParaRPr lang="zh-TW" altLang="en-US" dirty="0"/>
+          </a:p>
+        </p:txBody>
+      </p:sp>
+      <p:sp>
+        <p:nvSpPr>
+          <p:cNvPr id="13" name="矩形 12"/>
+          <p:cNvSpPr/>
+          <p:nvPr/>
+        </p:nvSpPr>
+        <p:spPr>
+          <a:xfrm>
+            <a:off x="1828800" y="1181100"/>
+            <a:ext cx="482600" cy="393700"/>
+          </a:xfrm>
+          <a:prstGeom prst="rect">
+            <a:avLst/>
+          </a:prstGeom>
+        </p:spPr>
+        <p:style>
+          <a:lnRef idx="1">
+            <a:schemeClr val="accent2"/>
+          </a:lnRef>
+          <a:fillRef idx="3">
+            <a:schemeClr val="accent2"/>
+          </a:fillRef>
+          <a:effectRef idx="2">
+            <a:schemeClr val="accent2"/>
+          </a:effectRef>
+          <a:fontRef idx="minor">
+            <a:schemeClr val="lt1"/>
+          </a:fontRef>
+        </p:style>
+        <p:txBody>
+          <a:bodyPr rtlCol="0" anchor="ctr"/>
+          <a:lstStyle/>
+          <a:p>
+            <a:pPr algn="ctr"/>
+            <a:endParaRPr lang="zh-TW" altLang="en-US"/>
+          </a:p>
+        </p:txBody>
+      </p:sp>
+      <p:sp>
+        <p:nvSpPr>
+          <p:cNvPr id="17" name="矩形 16"/>
+          <p:cNvSpPr/>
+          <p:nvPr/>
+        </p:nvSpPr>
+        <p:spPr>
+          <a:xfrm>
+            <a:off x="2432050" y="1181100"/>
+            <a:ext cx="482600" cy="393700"/>
+          </a:xfrm>
+          <a:prstGeom prst="rect">
+            <a:avLst/>
+          </a:prstGeom>
+        </p:spPr>
+        <p:style>
+          <a:lnRef idx="1">
+            <a:schemeClr val="accent2"/>
+          </a:lnRef>
+          <a:fillRef idx="3">
+            <a:schemeClr val="accent2"/>
+          </a:fillRef>
+          <a:effectRef idx="2">
+            <a:schemeClr val="accent2"/>
+          </a:effectRef>
+          <a:fontRef idx="minor">
+            <a:schemeClr val="lt1"/>
+          </a:fontRef>
+        </p:style>
+        <p:txBody>
+          <a:bodyPr rtlCol="0" anchor="ctr"/>
+          <a:lstStyle/>
+          <a:p>
+            <a:pPr algn="ctr"/>
+            <a:endParaRPr lang="zh-TW" altLang="en-US"/>
+          </a:p>
+        </p:txBody>
+      </p:sp>
+      <p:sp>
+        <p:nvSpPr>
+          <p:cNvPr id="18" name="矩形 17"/>
+          <p:cNvSpPr/>
+          <p:nvPr/>
+        </p:nvSpPr>
+        <p:spPr>
+          <a:xfrm>
+            <a:off x="4533900" y="1181100"/>
+            <a:ext cx="482600" cy="393700"/>
+          </a:xfrm>
+          <a:prstGeom prst="rect">
+            <a:avLst/>
+          </a:prstGeom>
+        </p:spPr>
+        <p:style>
+          <a:lnRef idx="1">
+            <a:schemeClr val="accent2"/>
+          </a:lnRef>
+          <a:fillRef idx="3">
+            <a:schemeClr val="accent2"/>
+          </a:fillRef>
+          <a:effectRef idx="2">
+            <a:schemeClr val="accent2"/>
+          </a:effectRef>
+          <a:fontRef idx="minor">
+            <a:schemeClr val="lt1"/>
+          </a:fontRef>
+        </p:style>
+        <p:txBody>
+          <a:bodyPr rtlCol="0" anchor="ctr"/>
+          <a:lstStyle/>
+          <a:p>
+            <a:pPr algn="ctr"/>
+            <a:endParaRPr lang="zh-TW" altLang="en-US"/>
+          </a:p>
+        </p:txBody>
+      </p:sp>
+      <p:sp>
+        <p:nvSpPr>
+          <p:cNvPr id="19" name="矩形 18"/>
+          <p:cNvSpPr/>
+          <p:nvPr/>
+        </p:nvSpPr>
+        <p:spPr>
+          <a:xfrm>
+            <a:off x="7524750" y="1181100"/>
+            <a:ext cx="482600" cy="393700"/>
+          </a:xfrm>
+          <a:prstGeom prst="rect">
+            <a:avLst/>
+          </a:prstGeom>
+        </p:spPr>
+        <p:style>
+          <a:lnRef idx="1">
+            <a:schemeClr val="accent2"/>
+          </a:lnRef>
+          <a:fillRef idx="3">
+            <a:schemeClr val="accent2"/>
+          </a:fillRef>
+          <a:effectRef idx="2">
+            <a:schemeClr val="accent2"/>
+          </a:effectRef>
+          <a:fontRef idx="minor">
+            <a:schemeClr val="lt1"/>
+          </a:fontRef>
+        </p:style>
+        <p:txBody>
+          <a:bodyPr rtlCol="0" anchor="ctr"/>
+          <a:lstStyle/>
+          <a:p>
+            <a:pPr algn="ctr"/>
+            <a:endParaRPr lang="zh-TW" altLang="en-US"/>
+          </a:p>
+        </p:txBody>
+      </p:sp>
+      <p:sp>
+        <p:nvSpPr>
+          <p:cNvPr id="20" name="矩形 19"/>
+          <p:cNvSpPr/>
+          <p:nvPr/>
+        </p:nvSpPr>
+        <p:spPr>
+          <a:xfrm>
+            <a:off x="8134350" y="1181100"/>
+            <a:ext cx="482600" cy="393700"/>
+          </a:xfrm>
+          <a:prstGeom prst="rect">
+            <a:avLst/>
+          </a:prstGeom>
+        </p:spPr>
+        <p:style>
+          <a:lnRef idx="1">
+            <a:schemeClr val="accent2"/>
+          </a:lnRef>
+          <a:fillRef idx="3">
+            <a:schemeClr val="accent2"/>
+          </a:fillRef>
+          <a:effectRef idx="2">
+            <a:schemeClr val="accent2"/>
+          </a:effectRef>
+          <a:fontRef idx="minor">
+            <a:schemeClr val="lt1"/>
+          </a:fontRef>
+        </p:style>
+        <p:txBody>
+          <a:bodyPr rtlCol="0" anchor="ctr"/>
+          <a:lstStyle/>
+          <a:p>
+            <a:pPr algn="ctr"/>
+            <a:endParaRPr lang="zh-TW" altLang="en-US"/>
+          </a:p>
+        </p:txBody>
+      </p:sp>
+      <p:sp>
+        <p:nvSpPr>
+          <p:cNvPr id="21" name="矩形 20"/>
+          <p:cNvSpPr/>
+          <p:nvPr/>
+        </p:nvSpPr>
+        <p:spPr>
+          <a:xfrm>
+            <a:off x="10602449" y="2097763"/>
+            <a:ext cx="482600" cy="393700"/>
+          </a:xfrm>
+          <a:prstGeom prst="rect">
+            <a:avLst/>
+          </a:prstGeom>
+        </p:spPr>
+        <p:style>
+          <a:lnRef idx="1">
+            <a:schemeClr val="accent4"/>
+          </a:lnRef>
+          <a:fillRef idx="3">
+            <a:schemeClr val="accent4"/>
+          </a:fillRef>
+          <a:effectRef idx="2">
+            <a:schemeClr val="accent4"/>
+          </a:effectRef>
+          <a:fontRef idx="minor">
+            <a:schemeClr val="lt1"/>
+          </a:fontRef>
+        </p:style>
+        <p:txBody>
+          <a:bodyPr rtlCol="0" anchor="ctr"/>
+          <a:lstStyle/>
+          <a:p>
+            <a:pPr algn="ctr"/>
+            <a:endParaRPr lang="zh-TW" altLang="en-US"/>
+          </a:p>
+        </p:txBody>
+      </p:sp>
+      <p:cxnSp>
+        <p:nvCxnSpPr>
+          <p:cNvPr id="16" name="直線接點 15"/>
+          <p:cNvCxnSpPr>
+            <a:stCxn id="20" idx="2"/>
+          </p:cNvCxnSpPr>
+          <p:nvPr/>
+        </p:nvCxnSpPr>
+        <p:spPr>
+          <a:xfrm>
+            <a:off x="8375650" y="1574800"/>
+            <a:ext cx="0" cy="3022600"/>
+          </a:xfrm>
+          <a:prstGeom prst="line">
+            <a:avLst/>
+          </a:prstGeom>
+        </p:spPr>
+        <p:style>
+          <a:lnRef idx="1">
+            <a:schemeClr val="accent1"/>
+          </a:lnRef>
+          <a:fillRef idx="0">
+            <a:schemeClr val="accent1"/>
+          </a:fillRef>
+          <a:effectRef idx="0">
+            <a:schemeClr val="accent1"/>
+          </a:effectRef>
+          <a:fontRef idx="minor">
+            <a:schemeClr val="tx1"/>
+          </a:fontRef>
+        </p:style>
+      </p:cxnSp>
+      <p:cxnSp>
+        <p:nvCxnSpPr>
+          <p:cNvPr id="24" name="直線接點 23"/>
+          <p:cNvCxnSpPr/>
+          <p:nvPr/>
+        </p:nvCxnSpPr>
+        <p:spPr>
+          <a:xfrm>
+            <a:off x="7708900" y="1574800"/>
+            <a:ext cx="0" cy="3022600"/>
+          </a:xfrm>
+          <a:prstGeom prst="line">
+            <a:avLst/>
+          </a:prstGeom>
+        </p:spPr>
+        <p:style>
+          <a:lnRef idx="1">
+            <a:schemeClr val="accent1"/>
+          </a:lnRef>
+          <a:fillRef idx="0">
+            <a:schemeClr val="accent1"/>
+          </a:fillRef>
+          <a:effectRef idx="0">
+            <a:schemeClr val="accent1"/>
+          </a:effectRef>
+          <a:fontRef idx="minor">
+            <a:schemeClr val="tx1"/>
+          </a:fontRef>
+        </p:style>
+      </p:cxnSp>
+      <p:cxnSp>
+        <p:nvCxnSpPr>
+          <p:cNvPr id="25" name="直線接點 24"/>
+          <p:cNvCxnSpPr/>
+          <p:nvPr/>
+        </p:nvCxnSpPr>
+        <p:spPr>
+          <a:xfrm>
+            <a:off x="4775200" y="1574800"/>
+            <a:ext cx="0" cy="3022600"/>
+          </a:xfrm>
+          <a:prstGeom prst="line">
+            <a:avLst/>
+          </a:prstGeom>
+        </p:spPr>
+        <p:style>
+          <a:lnRef idx="1">
+            <a:schemeClr val="accent1"/>
+          </a:lnRef>
+          <a:fillRef idx="0">
+            <a:schemeClr val="accent1"/>
+          </a:fillRef>
+          <a:effectRef idx="0">
+            <a:schemeClr val="accent1"/>
+          </a:effectRef>
+          <a:fontRef idx="minor">
+            <a:schemeClr val="tx1"/>
+          </a:fontRef>
+        </p:style>
+      </p:cxnSp>
+      <p:cxnSp>
+        <p:nvCxnSpPr>
+          <p:cNvPr id="26" name="直線接點 25"/>
+          <p:cNvCxnSpPr/>
+          <p:nvPr/>
+        </p:nvCxnSpPr>
+        <p:spPr>
+          <a:xfrm>
+            <a:off x="2705100" y="1574800"/>
+            <a:ext cx="0" cy="3022600"/>
+          </a:xfrm>
+          <a:prstGeom prst="line">
+            <a:avLst/>
+          </a:prstGeom>
+        </p:spPr>
+        <p:style>
+          <a:lnRef idx="1">
+            <a:schemeClr val="accent1"/>
+          </a:lnRef>
+          <a:fillRef idx="0">
+            <a:schemeClr val="accent1"/>
+          </a:fillRef>
+          <a:effectRef idx="0">
+            <a:schemeClr val="accent1"/>
+          </a:effectRef>
+          <a:fontRef idx="minor">
+            <a:schemeClr val="tx1"/>
+          </a:fontRef>
+        </p:style>
+      </p:cxnSp>
+      <p:cxnSp>
+        <p:nvCxnSpPr>
+          <p:cNvPr id="27" name="直線接點 26"/>
+          <p:cNvCxnSpPr/>
+          <p:nvPr/>
+        </p:nvCxnSpPr>
+        <p:spPr>
+          <a:xfrm>
+            <a:off x="2057400" y="1574800"/>
+            <a:ext cx="0" cy="3022600"/>
+          </a:xfrm>
+          <a:prstGeom prst="line">
+            <a:avLst/>
+          </a:prstGeom>
+        </p:spPr>
+        <p:style>
+          <a:lnRef idx="1">
+            <a:schemeClr val="accent1"/>
+          </a:lnRef>
+          <a:fillRef idx="0">
+            <a:schemeClr val="accent1"/>
+          </a:fillRef>
+          <a:effectRef idx="0">
+            <a:schemeClr val="accent1"/>
+          </a:effectRef>
+          <a:fontRef idx="minor">
+            <a:schemeClr val="tx1"/>
+          </a:fontRef>
+        </p:style>
+      </p:cxnSp>
+      <p:cxnSp>
+        <p:nvCxnSpPr>
+          <p:cNvPr id="28" name="直線接點 27"/>
+          <p:cNvCxnSpPr>
+            <a:stCxn id="21" idx="2"/>
+          </p:cNvCxnSpPr>
+          <p:nvPr/>
+        </p:nvCxnSpPr>
+        <p:spPr>
+          <a:xfrm>
+            <a:off x="10843749" y="2491463"/>
+            <a:ext cx="0" cy="2105937"/>
+          </a:xfrm>
+          <a:prstGeom prst="line">
+            <a:avLst/>
+          </a:prstGeom>
+        </p:spPr>
+        <p:style>
+          <a:lnRef idx="1">
+            <a:schemeClr val="accent1"/>
+          </a:lnRef>
+          <a:fillRef idx="0">
+            <a:schemeClr val="accent1"/>
+          </a:fillRef>
+          <a:effectRef idx="0">
+            <a:schemeClr val="accent1"/>
+          </a:effectRef>
+          <a:fontRef idx="minor">
+            <a:schemeClr val="tx1"/>
+          </a:fontRef>
+        </p:style>
+      </p:cxnSp>
+    </p:spTree>
+    <p:extLst>
+      <p:ext uri="{BB962C8B-B14F-4D97-AF65-F5344CB8AC3E}">
+        <p14:creationId xmlns:p14="http://schemas.microsoft.com/office/powerpoint/2010/main" val="2947665281"/>
+      </p:ext>
+    </p:extLst>
+  </p:cSld>
+  <p:clrMapOvr>
+    <a:masterClrMapping/>
+  </p:clrMapOvr>
+  <p:timing>
+    <p:tnLst>
+      <p:par>
+        <p:cTn id="1" dur="indefinite" restart="never" nodeType="tmRoot"/>
+      </p:par>
+    </p:tnLst>
+  </p:timing>
+</p:sld>
+</file>
+
 <file path=ppt/theme/theme1.xml><?xml version="1.0" encoding="utf-8"?>
 <a:theme xmlns:a="http://schemas.openxmlformats.org/drawingml/2006/main" name="Office 佈景主題">
   <a:themeElements>

</xml_diff>